<commit_message>
Fix software stack image
</commit_message>
<xml_diff>
--- a/images/sources/software-stack.pptx
+++ b/images/sources/software-stack.pptx
@@ -107,6 +107,11 @@
       </a:defRPr>
     </a:lvl9pPr>
   </p:defaultTextStyle>
+  <p:extLst>
+    <p:ext uri="{EFAFB233-063F-42B5-8137-9DF3F51BA10A}">
+      <p15:sldGuideLst xmlns:p15="http://schemas.microsoft.com/office/powerpoint/2012/main"/>
+    </p:ext>
+  </p:extLst>
 </p:presentation>
 </file>
 
@@ -192,7 +197,7 @@
           <a:p>
             <a:fld id="{EBC9B4AF-00B8-9B49-A331-47821E9A109F}" type="datetimeFigureOut">
               <a:rPr lang="de-DE" smtClean="0"/>
-              <a:t>01.07.19</a:t>
+              <a:t>16.07.2019</a:t>
             </a:fld>
             <a:endParaRPr lang="de-DE"/>
           </a:p>
@@ -350,7 +355,7 @@
           <a:p>
             <a:fld id="{8FF1BA80-479D-1A4A-B611-4F518723620D}" type="slidenum">
               <a:rPr lang="de-DE" smtClean="0"/>
-              <a:t>‹Nr.›</a:t>
+              <a:t>‹#›</a:t>
             </a:fld>
             <a:endParaRPr lang="de-DE"/>
           </a:p>
@@ -679,7 +684,7 @@
           <a:p>
             <a:fld id="{6FF236C8-150B-1847-A3A3-D70DFB942AB3}" type="datetimeFigureOut">
               <a:rPr lang="de-DE" smtClean="0"/>
-              <a:t>01.07.19</a:t>
+              <a:t>16.07.2019</a:t>
             </a:fld>
             <a:endParaRPr lang="de-DE"/>
           </a:p>
@@ -721,7 +726,7 @@
           <a:p>
             <a:fld id="{0AC82312-5793-8543-9CDB-82D1BFFF2087}" type="slidenum">
               <a:rPr lang="de-DE" smtClean="0"/>
-              <a:t>‹Nr.›</a:t>
+              <a:t>‹#›</a:t>
             </a:fld>
             <a:endParaRPr lang="de-DE"/>
           </a:p>
@@ -849,7 +854,7 @@
           <a:p>
             <a:fld id="{6FF236C8-150B-1847-A3A3-D70DFB942AB3}" type="datetimeFigureOut">
               <a:rPr lang="de-DE" smtClean="0"/>
-              <a:t>01.07.19</a:t>
+              <a:t>16.07.2019</a:t>
             </a:fld>
             <a:endParaRPr lang="de-DE"/>
           </a:p>
@@ -891,7 +896,7 @@
           <a:p>
             <a:fld id="{0AC82312-5793-8543-9CDB-82D1BFFF2087}" type="slidenum">
               <a:rPr lang="de-DE" smtClean="0"/>
-              <a:t>‹Nr.›</a:t>
+              <a:t>‹#›</a:t>
             </a:fld>
             <a:endParaRPr lang="de-DE"/>
           </a:p>
@@ -1029,7 +1034,7 @@
           <a:p>
             <a:fld id="{6FF236C8-150B-1847-A3A3-D70DFB942AB3}" type="datetimeFigureOut">
               <a:rPr lang="de-DE" smtClean="0"/>
-              <a:t>01.07.19</a:t>
+              <a:t>16.07.2019</a:t>
             </a:fld>
             <a:endParaRPr lang="de-DE"/>
           </a:p>
@@ -1071,7 +1076,7 @@
           <a:p>
             <a:fld id="{0AC82312-5793-8543-9CDB-82D1BFFF2087}" type="slidenum">
               <a:rPr lang="de-DE" smtClean="0"/>
-              <a:t>‹Nr.›</a:t>
+              <a:t>‹#›</a:t>
             </a:fld>
             <a:endParaRPr lang="de-DE"/>
           </a:p>
@@ -1199,7 +1204,7 @@
           <a:p>
             <a:fld id="{6FF236C8-150B-1847-A3A3-D70DFB942AB3}" type="datetimeFigureOut">
               <a:rPr lang="de-DE" smtClean="0"/>
-              <a:t>01.07.19</a:t>
+              <a:t>16.07.2019</a:t>
             </a:fld>
             <a:endParaRPr lang="de-DE"/>
           </a:p>
@@ -1241,7 +1246,7 @@
           <a:p>
             <a:fld id="{0AC82312-5793-8543-9CDB-82D1BFFF2087}" type="slidenum">
               <a:rPr lang="de-DE" smtClean="0"/>
-              <a:t>‹Nr.›</a:t>
+              <a:t>‹#›</a:t>
             </a:fld>
             <a:endParaRPr lang="de-DE"/>
           </a:p>
@@ -1445,7 +1450,7 @@
           <a:p>
             <a:fld id="{6FF236C8-150B-1847-A3A3-D70DFB942AB3}" type="datetimeFigureOut">
               <a:rPr lang="de-DE" smtClean="0"/>
-              <a:t>01.07.19</a:t>
+              <a:t>16.07.2019</a:t>
             </a:fld>
             <a:endParaRPr lang="de-DE"/>
           </a:p>
@@ -1487,7 +1492,7 @@
           <a:p>
             <a:fld id="{0AC82312-5793-8543-9CDB-82D1BFFF2087}" type="slidenum">
               <a:rPr lang="de-DE" smtClean="0"/>
-              <a:t>‹Nr.›</a:t>
+              <a:t>‹#›</a:t>
             </a:fld>
             <a:endParaRPr lang="de-DE"/>
           </a:p>
@@ -1677,7 +1682,7 @@
           <a:p>
             <a:fld id="{6FF236C8-150B-1847-A3A3-D70DFB942AB3}" type="datetimeFigureOut">
               <a:rPr lang="de-DE" smtClean="0"/>
-              <a:t>01.07.19</a:t>
+              <a:t>16.07.2019</a:t>
             </a:fld>
             <a:endParaRPr lang="de-DE"/>
           </a:p>
@@ -1719,7 +1724,7 @@
           <a:p>
             <a:fld id="{0AC82312-5793-8543-9CDB-82D1BFFF2087}" type="slidenum">
               <a:rPr lang="de-DE" smtClean="0"/>
-              <a:t>‹Nr.›</a:t>
+              <a:t>‹#›</a:t>
             </a:fld>
             <a:endParaRPr lang="de-DE"/>
           </a:p>
@@ -2044,7 +2049,7 @@
           <a:p>
             <a:fld id="{6FF236C8-150B-1847-A3A3-D70DFB942AB3}" type="datetimeFigureOut">
               <a:rPr lang="de-DE" smtClean="0"/>
-              <a:t>01.07.19</a:t>
+              <a:t>16.07.2019</a:t>
             </a:fld>
             <a:endParaRPr lang="de-DE"/>
           </a:p>
@@ -2086,7 +2091,7 @@
           <a:p>
             <a:fld id="{0AC82312-5793-8543-9CDB-82D1BFFF2087}" type="slidenum">
               <a:rPr lang="de-DE" smtClean="0"/>
-              <a:t>‹Nr.›</a:t>
+              <a:t>‹#›</a:t>
             </a:fld>
             <a:endParaRPr lang="de-DE"/>
           </a:p>
@@ -2162,7 +2167,7 @@
           <a:p>
             <a:fld id="{6FF236C8-150B-1847-A3A3-D70DFB942AB3}" type="datetimeFigureOut">
               <a:rPr lang="de-DE" smtClean="0"/>
-              <a:t>01.07.19</a:t>
+              <a:t>16.07.2019</a:t>
             </a:fld>
             <a:endParaRPr lang="de-DE"/>
           </a:p>
@@ -2204,7 +2209,7 @@
           <a:p>
             <a:fld id="{0AC82312-5793-8543-9CDB-82D1BFFF2087}" type="slidenum">
               <a:rPr lang="de-DE" smtClean="0"/>
-              <a:t>‹Nr.›</a:t>
+              <a:t>‹#›</a:t>
             </a:fld>
             <a:endParaRPr lang="de-DE"/>
           </a:p>
@@ -2257,7 +2262,7 @@
           <a:p>
             <a:fld id="{6FF236C8-150B-1847-A3A3-D70DFB942AB3}" type="datetimeFigureOut">
               <a:rPr lang="de-DE" smtClean="0"/>
-              <a:t>01.07.19</a:t>
+              <a:t>16.07.2019</a:t>
             </a:fld>
             <a:endParaRPr lang="de-DE"/>
           </a:p>
@@ -2299,7 +2304,7 @@
           <a:p>
             <a:fld id="{0AC82312-5793-8543-9CDB-82D1BFFF2087}" type="slidenum">
               <a:rPr lang="de-DE" smtClean="0"/>
-              <a:t>‹Nr.›</a:t>
+              <a:t>‹#›</a:t>
             </a:fld>
             <a:endParaRPr lang="de-DE"/>
           </a:p>
@@ -2534,7 +2539,7 @@
           <a:p>
             <a:fld id="{6FF236C8-150B-1847-A3A3-D70DFB942AB3}" type="datetimeFigureOut">
               <a:rPr lang="de-DE" smtClean="0"/>
-              <a:t>01.07.19</a:t>
+              <a:t>16.07.2019</a:t>
             </a:fld>
             <a:endParaRPr lang="de-DE"/>
           </a:p>
@@ -2576,7 +2581,7 @@
           <a:p>
             <a:fld id="{0AC82312-5793-8543-9CDB-82D1BFFF2087}" type="slidenum">
               <a:rPr lang="de-DE" smtClean="0"/>
-              <a:t>‹Nr.›</a:t>
+              <a:t>‹#›</a:t>
             </a:fld>
             <a:endParaRPr lang="de-DE"/>
           </a:p>
@@ -2791,7 +2796,7 @@
           <a:p>
             <a:fld id="{6FF236C8-150B-1847-A3A3-D70DFB942AB3}" type="datetimeFigureOut">
               <a:rPr lang="de-DE" smtClean="0"/>
-              <a:t>01.07.19</a:t>
+              <a:t>16.07.2019</a:t>
             </a:fld>
             <a:endParaRPr lang="de-DE"/>
           </a:p>
@@ -2833,7 +2838,7 @@
           <a:p>
             <a:fld id="{0AC82312-5793-8543-9CDB-82D1BFFF2087}" type="slidenum">
               <a:rPr lang="de-DE" smtClean="0"/>
-              <a:t>‹Nr.›</a:t>
+              <a:t>‹#›</a:t>
             </a:fld>
             <a:endParaRPr lang="de-DE"/>
           </a:p>
@@ -3004,7 +3009,7 @@
           <a:p>
             <a:fld id="{6FF236C8-150B-1847-A3A3-D70DFB942AB3}" type="datetimeFigureOut">
               <a:rPr lang="de-DE" smtClean="0"/>
-              <a:t>01.07.19</a:t>
+              <a:t>16.07.2019</a:t>
             </a:fld>
             <a:endParaRPr lang="de-DE"/>
           </a:p>
@@ -3082,7 +3087,7 @@
           <a:p>
             <a:fld id="{0AC82312-5793-8543-9CDB-82D1BFFF2087}" type="slidenum">
               <a:rPr lang="de-DE" smtClean="0"/>
-              <a:t>‹Nr.›</a:t>
+              <a:t>‹#›</a:t>
             </a:fld>
             <a:endParaRPr lang="de-DE"/>
           </a:p>
@@ -3626,43 +3631,6 @@
           </p:txBody>
         </p:sp>
       </p:grpSp>
-      <p:cxnSp>
-        <p:nvCxnSpPr>
-          <p:cNvPr id="91" name="Gerade Verbindung mit Pfeil 97"/>
-          <p:cNvCxnSpPr/>
-          <p:nvPr/>
-        </p:nvCxnSpPr>
-        <p:spPr>
-          <a:xfrm flipV="1">
-            <a:off x="4399222" y="4714897"/>
-            <a:ext cx="0" cy="583347"/>
-          </a:xfrm>
-          <a:prstGeom prst="straightConnector1">
-            <a:avLst/>
-          </a:prstGeom>
-          <a:ln w="44450">
-            <a:solidFill>
-              <a:schemeClr val="dk1"/>
-            </a:solidFill>
-            <a:headEnd type="none"/>
-            <a:tailEnd type="triangle"/>
-          </a:ln>
-        </p:spPr>
-        <p:style>
-          <a:lnRef idx="3">
-            <a:schemeClr val="dk1"/>
-          </a:lnRef>
-          <a:fillRef idx="0">
-            <a:schemeClr val="dk1"/>
-          </a:fillRef>
-          <a:effectRef idx="2">
-            <a:schemeClr val="dk1"/>
-          </a:effectRef>
-          <a:fontRef idx="minor">
-            <a:schemeClr val="tx1"/>
-          </a:fontRef>
-        </p:style>
-      </p:cxnSp>
       <p:pic>
         <p:nvPicPr>
           <p:cNvPr id="30" name="Picture 29"/>
@@ -4083,7 +4051,7 @@
         </p:nvGrpSpPr>
         <p:grpSpPr>
           <a:xfrm>
-            <a:off x="3851973" y="293487"/>
+            <a:off x="3758530" y="293487"/>
             <a:ext cx="1444670" cy="1395755"/>
             <a:chOff x="3127487" y="323171"/>
             <a:chExt cx="1444670" cy="1395755"/>
@@ -4377,90 +4345,74 @@
           </a:p>
         </p:txBody>
       </p:sp>
-      <p:sp>
-        <p:nvSpPr>
-          <p:cNvPr id="174" name="Rechteck 94"/>
-          <p:cNvSpPr/>
-          <p:nvPr/>
-        </p:nvSpPr>
-        <p:spPr>
-          <a:xfrm>
-            <a:off x="3851976" y="2865034"/>
-            <a:ext cx="1343743" cy="1849863"/>
-          </a:xfrm>
-          <a:prstGeom prst="rect">
-            <a:avLst/>
-          </a:prstGeom>
-          <a:solidFill>
-            <a:schemeClr val="bg1"/>
-          </a:solidFill>
-          <a:ln w="12700"/>
-        </p:spPr>
-        <p:style>
-          <a:lnRef idx="2">
-            <a:schemeClr val="dk1"/>
-          </a:lnRef>
-          <a:fillRef idx="1">
-            <a:schemeClr val="lt1"/>
-          </a:fillRef>
-          <a:effectRef idx="0">
-            <a:schemeClr val="dk1"/>
-          </a:effectRef>
-          <a:fontRef idx="minor">
-            <a:schemeClr val="dk1"/>
-          </a:fontRef>
-        </p:style>
-        <p:txBody>
-          <a:bodyPr anchor="t"/>
-          <a:lstStyle/>
-          <a:p>
-            <a:pPr algn="ctr"/>
-            <a:r>
-              <a:rPr lang="en-GB" sz="1300" b="1" dirty="0">
-                <a:solidFill>
-                  <a:schemeClr val="tx1"/>
-                </a:solidFill>
-                <a:latin typeface="Myriad Pro SemiCond" panose="020B0503030403020204" pitchFamily="34" charset="0"/>
-              </a:rPr>
-              <a:t>Analysis</a:t>
-            </a:r>
-            <a:endParaRPr lang="en-US" sz="1300" b="1" dirty="0">
-              <a:solidFill>
-                <a:schemeClr val="tx1"/>
-              </a:solidFill>
-              <a:latin typeface="Myriad Pro SemiCond" panose="020B0503030403020204" pitchFamily="34" charset="0"/>
-            </a:endParaRPr>
-          </a:p>
-        </p:txBody>
-      </p:sp>
       <p:grpSp>
         <p:nvGrpSpPr>
-          <p:cNvPr id="33" name="Group 32"/>
+          <p:cNvPr id="4" name="Group 3"/>
           <p:cNvGrpSpPr/>
           <p:nvPr/>
         </p:nvGrpSpPr>
         <p:grpSpPr>
           <a:xfrm>
-            <a:off x="3945192" y="3649366"/>
-            <a:ext cx="1162693" cy="452716"/>
-            <a:chOff x="4083144" y="2781360"/>
-            <a:chExt cx="1162693" cy="452716"/>
+            <a:off x="5088176" y="2853281"/>
+            <a:ext cx="1987170" cy="2433210"/>
+            <a:chOff x="3478198" y="2865034"/>
+            <a:chExt cx="1987170" cy="2433210"/>
           </a:xfrm>
         </p:grpSpPr>
+        <p:cxnSp>
+          <p:nvCxnSpPr>
+            <p:cNvPr id="91" name="Gerade Verbindung mit Pfeil 97"/>
+            <p:cNvCxnSpPr/>
+            <p:nvPr/>
+          </p:nvCxnSpPr>
+          <p:spPr>
+            <a:xfrm flipV="1">
+              <a:off x="4399222" y="4714897"/>
+              <a:ext cx="0" cy="583347"/>
+            </a:xfrm>
+            <a:prstGeom prst="straightConnector1">
+              <a:avLst/>
+            </a:prstGeom>
+            <a:ln w="44450">
+              <a:solidFill>
+                <a:schemeClr val="dk1"/>
+              </a:solidFill>
+              <a:headEnd type="none"/>
+              <a:tailEnd type="triangle"/>
+            </a:ln>
+          </p:spPr>
+          <p:style>
+            <a:lnRef idx="3">
+              <a:schemeClr val="dk1"/>
+            </a:lnRef>
+            <a:fillRef idx="0">
+              <a:schemeClr val="dk1"/>
+            </a:fillRef>
+            <a:effectRef idx="2">
+              <a:schemeClr val="dk1"/>
+            </a:effectRef>
+            <a:fontRef idx="minor">
+              <a:schemeClr val="tx1"/>
+            </a:fontRef>
+          </p:style>
+        </p:cxnSp>
         <p:sp>
           <p:nvSpPr>
-            <p:cNvPr id="176" name="Rechteck 94"/>
+            <p:cNvPr id="174" name="Rechteck 94"/>
             <p:cNvSpPr/>
             <p:nvPr/>
           </p:nvSpPr>
           <p:spPr>
             <a:xfrm>
-              <a:off x="4083144" y="2781360"/>
-              <a:ext cx="1162693" cy="452716"/>
+              <a:off x="3851976" y="2865034"/>
+              <a:ext cx="1343743" cy="1849863"/>
             </a:xfrm>
             <a:prstGeom prst="rect">
               <a:avLst/>
             </a:prstGeom>
+            <a:solidFill>
+              <a:schemeClr val="bg1"/>
+            </a:solidFill>
             <a:ln w="12700"/>
           </p:spPr>
           <p:style>
@@ -4478,446 +4430,224 @@
             </a:fontRef>
           </p:style>
           <p:txBody>
-            <a:bodyPr anchor="ctr"/>
+            <a:bodyPr anchor="t"/>
             <a:lstStyle/>
             <a:p>
-              <a:pPr algn="ctr">
-                <a:defRPr/>
-              </a:pPr>
-              <a:endParaRPr lang="en-US" sz="1400" dirty="0">
+              <a:pPr algn="ctr"/>
+              <a:r>
+                <a:rPr lang="en-GB" sz="1300" b="1" dirty="0">
+                  <a:solidFill>
+                    <a:schemeClr val="tx1"/>
+                  </a:solidFill>
+                  <a:latin typeface="Myriad Pro SemiCond" panose="020B0503030403020204" pitchFamily="34" charset="0"/>
+                </a:rPr>
+                <a:t>Analysis</a:t>
+              </a:r>
+              <a:endParaRPr lang="en-US" sz="1300" b="1" dirty="0">
+                <a:solidFill>
+                  <a:schemeClr val="tx1"/>
+                </a:solidFill>
                 <a:latin typeface="Myriad Pro SemiCond" panose="020B0503030403020204" pitchFamily="34" charset="0"/>
               </a:endParaRPr>
             </a:p>
           </p:txBody>
         </p:sp>
-        <p:pic>
-          <p:nvPicPr>
-            <p:cNvPr id="20" name="Picture 19"/>
-            <p:cNvPicPr>
-              <a:picLocks noChangeAspect="1"/>
-            </p:cNvPicPr>
+        <p:grpSp>
+          <p:nvGrpSpPr>
+            <p:cNvPr id="33" name="Group 32"/>
+            <p:cNvGrpSpPr/>
             <p:nvPr/>
-          </p:nvPicPr>
-          <p:blipFill>
-            <a:blip r:embed="rId8" cstate="print">
-              <a:extLst>
-                <a:ext uri="{28A0092B-C50C-407E-A947-70E740481C1C}">
-                  <a14:useLocalDpi xmlns:a14="http://schemas.microsoft.com/office/drawing/2010/main" val="0"/>
-                </a:ext>
-              </a:extLst>
-            </a:blip>
-            <a:stretch>
-              <a:fillRect/>
-            </a:stretch>
-          </p:blipFill>
+          </p:nvGrpSpPr>
+          <p:grpSpPr>
+            <a:xfrm>
+              <a:off x="3945192" y="3649366"/>
+              <a:ext cx="1162693" cy="452716"/>
+              <a:chOff x="4083144" y="2781360"/>
+              <a:chExt cx="1162693" cy="452716"/>
+            </a:xfrm>
+          </p:grpSpPr>
+          <p:sp>
+            <p:nvSpPr>
+              <p:cNvPr id="176" name="Rechteck 94"/>
+              <p:cNvSpPr/>
+              <p:nvPr/>
+            </p:nvSpPr>
+            <p:spPr>
+              <a:xfrm>
+                <a:off x="4083144" y="2781360"/>
+                <a:ext cx="1162693" cy="452716"/>
+              </a:xfrm>
+              <a:prstGeom prst="rect">
+                <a:avLst/>
+              </a:prstGeom>
+              <a:ln w="12700"/>
+            </p:spPr>
+            <p:style>
+              <a:lnRef idx="2">
+                <a:schemeClr val="dk1"/>
+              </a:lnRef>
+              <a:fillRef idx="1">
+                <a:schemeClr val="lt1"/>
+              </a:fillRef>
+              <a:effectRef idx="0">
+                <a:schemeClr val="dk1"/>
+              </a:effectRef>
+              <a:fontRef idx="minor">
+                <a:schemeClr val="dk1"/>
+              </a:fontRef>
+            </p:style>
+            <p:txBody>
+              <a:bodyPr anchor="ctr"/>
+              <a:lstStyle/>
+              <a:p>
+                <a:pPr algn="ctr">
+                  <a:defRPr/>
+                </a:pPr>
+                <a:endParaRPr lang="en-US" sz="1400" dirty="0">
+                  <a:latin typeface="Myriad Pro SemiCond" panose="020B0503030403020204" pitchFamily="34" charset="0"/>
+                </a:endParaRPr>
+              </a:p>
+            </p:txBody>
+          </p:sp>
+          <p:pic>
+            <p:nvPicPr>
+              <p:cNvPr id="20" name="Picture 19"/>
+              <p:cNvPicPr>
+                <a:picLocks noChangeAspect="1"/>
+              </p:cNvPicPr>
+              <p:nvPr/>
+            </p:nvPicPr>
+            <p:blipFill>
+              <a:blip r:embed="rId8" cstate="print">
+                <a:extLst>
+                  <a:ext uri="{28A0092B-C50C-407E-A947-70E740481C1C}">
+                    <a14:useLocalDpi xmlns:a14="http://schemas.microsoft.com/office/drawing/2010/main" val="0"/>
+                  </a:ext>
+                </a:extLst>
+              </a:blip>
+              <a:stretch>
+                <a:fillRect/>
+              </a:stretch>
+            </p:blipFill>
+            <p:spPr>
+              <a:xfrm>
+                <a:off x="4117702" y="2866577"/>
+                <a:ext cx="1084040" cy="266194"/>
+              </a:xfrm>
+              <a:prstGeom prst="rect">
+                <a:avLst/>
+              </a:prstGeom>
+            </p:spPr>
+          </p:pic>
+        </p:grpSp>
+        <p:sp>
+          <p:nvSpPr>
+            <p:cNvPr id="181" name="TextBox 180"/>
+            <p:cNvSpPr txBox="1"/>
+            <p:nvPr/>
+          </p:nvSpPr>
           <p:spPr>
             <a:xfrm>
-              <a:off x="4117702" y="2866577"/>
-              <a:ext cx="1084040" cy="266194"/>
+              <a:off x="4412747" y="4828936"/>
+              <a:ext cx="1052621" cy="276999"/>
             </a:xfrm>
             <a:prstGeom prst="rect">
               <a:avLst/>
             </a:prstGeom>
+            <a:noFill/>
           </p:spPr>
-        </p:pic>
-      </p:grpSp>
-      <p:sp>
-        <p:nvSpPr>
-          <p:cNvPr id="181" name="TextBox 180"/>
-          <p:cNvSpPr txBox="1"/>
-          <p:nvPr/>
-        </p:nvSpPr>
-        <p:spPr>
-          <a:xfrm>
-            <a:off x="4412747" y="4828936"/>
-            <a:ext cx="1052621" cy="276999"/>
-          </a:xfrm>
-          <a:prstGeom prst="rect">
-            <a:avLst/>
-          </a:prstGeom>
-          <a:noFill/>
-        </p:spPr>
-        <p:txBody>
-          <a:bodyPr wrap="square" rtlCol="0">
-            <a:spAutoFit/>
-          </a:bodyPr>
-          <a:lstStyle/>
-          <a:p>
-            <a:pPr algn="ctr"/>
-            <a:r>
-              <a:rPr lang="de-DE" sz="1200" dirty="0">
-                <a:latin typeface="Myriad Pro SemiCond" panose="020B0503030403020204" pitchFamily="34" charset="0"/>
-              </a:rPr>
-              <a:t>Traces</a:t>
-            </a:r>
-            <a:endParaRPr lang="en-US" sz="1200" dirty="0">
-              <a:latin typeface="Myriad Pro SemiCond" panose="020B0503030403020204" pitchFamily="34" charset="0"/>
-            </a:endParaRPr>
-          </a:p>
-        </p:txBody>
-      </p:sp>
-      <p:cxnSp>
-        <p:nvCxnSpPr>
-          <p:cNvPr id="182" name="Gerade Verbindung mit Pfeil 97"/>
-          <p:cNvCxnSpPr/>
-          <p:nvPr/>
-        </p:nvCxnSpPr>
-        <p:spPr>
-          <a:xfrm rot="10800000" flipV="1">
-            <a:off x="4658302" y="4714894"/>
-            <a:ext cx="0" cy="583348"/>
-          </a:xfrm>
-          <a:prstGeom prst="straightConnector1">
-            <a:avLst/>
-          </a:prstGeom>
-          <a:ln w="44450">
-            <a:solidFill>
-              <a:schemeClr val="dk1"/>
-            </a:solidFill>
-            <a:headEnd type="none"/>
-            <a:tailEnd type="triangle"/>
-          </a:ln>
-        </p:spPr>
-        <p:style>
-          <a:lnRef idx="3">
-            <a:schemeClr val="dk1"/>
-          </a:lnRef>
-          <a:fillRef idx="0">
-            <a:schemeClr val="dk1"/>
-          </a:fillRef>
-          <a:effectRef idx="2">
-            <a:schemeClr val="dk1"/>
-          </a:effectRef>
-          <a:fontRef idx="minor">
-            <a:schemeClr val="tx1"/>
-          </a:fontRef>
-        </p:style>
-      </p:cxnSp>
-      <p:sp>
-        <p:nvSpPr>
-          <p:cNvPr id="184" name="TextBox 183"/>
-          <p:cNvSpPr txBox="1"/>
-          <p:nvPr/>
-        </p:nvSpPr>
-        <p:spPr>
-          <a:xfrm>
-            <a:off x="3478198" y="4828937"/>
-            <a:ext cx="1052621" cy="276999"/>
-          </a:xfrm>
-          <a:prstGeom prst="rect">
-            <a:avLst/>
-          </a:prstGeom>
-          <a:noFill/>
-        </p:spPr>
-        <p:txBody>
-          <a:bodyPr wrap="square" rtlCol="0">
-            <a:spAutoFit/>
-          </a:bodyPr>
-          <a:lstStyle/>
-          <a:p>
-            <a:pPr algn="ctr"/>
-            <a:r>
-              <a:rPr lang="de-DE" sz="1200" dirty="0">
-                <a:latin typeface="Myriad Pro SemiCond" panose="020B0503030403020204" pitchFamily="34" charset="0"/>
-              </a:rPr>
-              <a:t>Records</a:t>
-            </a:r>
-            <a:endParaRPr lang="en-US" sz="1200" dirty="0">
-              <a:latin typeface="Myriad Pro SemiCond" panose="020B0503030403020204" pitchFamily="34" charset="0"/>
-            </a:endParaRPr>
-          </a:p>
-        </p:txBody>
-      </p:sp>
-      <p:sp>
-        <p:nvSpPr>
-          <p:cNvPr id="201" name="Rechteck 94"/>
-          <p:cNvSpPr/>
-          <p:nvPr/>
-        </p:nvSpPr>
-        <p:spPr>
-          <a:xfrm>
-            <a:off x="5283604" y="2866815"/>
-            <a:ext cx="1343743" cy="1855968"/>
-          </a:xfrm>
-          <a:prstGeom prst="rect">
-            <a:avLst/>
-          </a:prstGeom>
-          <a:solidFill>
-            <a:schemeClr val="bg1"/>
-          </a:solidFill>
-          <a:ln w="12700"/>
-        </p:spPr>
-        <p:style>
-          <a:lnRef idx="2">
-            <a:schemeClr val="dk1"/>
-          </a:lnRef>
-          <a:fillRef idx="1">
-            <a:schemeClr val="lt1"/>
-          </a:fillRef>
-          <a:effectRef idx="0">
-            <a:schemeClr val="dk1"/>
-          </a:effectRef>
-          <a:fontRef idx="minor">
-            <a:schemeClr val="dk1"/>
-          </a:fontRef>
-        </p:style>
-        <p:txBody>
-          <a:bodyPr anchor="t"/>
-          <a:lstStyle/>
-          <a:p>
-            <a:pPr algn="ctr"/>
-            <a:r>
-              <a:rPr lang="en-GB" sz="1300" b="1" dirty="0">
-                <a:solidFill>
-                  <a:schemeClr val="tx1"/>
-                </a:solidFill>
-                <a:latin typeface="Myriad Pro SemiCond" panose="020B0503030403020204" pitchFamily="34" charset="0"/>
-              </a:rPr>
-              <a:t>Landscape</a:t>
-            </a:r>
-            <a:endParaRPr lang="en-US" sz="1300" b="1" dirty="0">
-              <a:solidFill>
-                <a:schemeClr val="tx1"/>
-              </a:solidFill>
-              <a:latin typeface="Myriad Pro SemiCond" panose="020B0503030403020204" pitchFamily="34" charset="0"/>
-            </a:endParaRPr>
-          </a:p>
-        </p:txBody>
-      </p:sp>
-      <p:grpSp>
-        <p:nvGrpSpPr>
-          <p:cNvPr id="202" name="Group 201"/>
-          <p:cNvGrpSpPr/>
-          <p:nvPr/>
-        </p:nvGrpSpPr>
-        <p:grpSpPr>
-          <a:xfrm>
-            <a:off x="5374128" y="3643001"/>
-            <a:ext cx="1162693" cy="452716"/>
-            <a:chOff x="2629873" y="1232261"/>
-            <a:chExt cx="1162693" cy="452716"/>
-          </a:xfrm>
-        </p:grpSpPr>
-        <p:sp>
-          <p:nvSpPr>
-            <p:cNvPr id="211" name="Rechteck 94"/>
-            <p:cNvSpPr/>
-            <p:nvPr/>
-          </p:nvSpPr>
-          <p:spPr>
-            <a:xfrm>
-              <a:off x="2629873" y="1232261"/>
-              <a:ext cx="1162693" cy="452716"/>
-            </a:xfrm>
-            <a:prstGeom prst="rect">
-              <a:avLst/>
-            </a:prstGeom>
-            <a:ln w="12700"/>
-          </p:spPr>
-          <p:style>
-            <a:lnRef idx="2">
-              <a:schemeClr val="dk1"/>
-            </a:lnRef>
-            <a:fillRef idx="1">
-              <a:schemeClr val="lt1"/>
-            </a:fillRef>
-            <a:effectRef idx="0">
-              <a:schemeClr val="dk1"/>
-            </a:effectRef>
-            <a:fontRef idx="minor">
-              <a:schemeClr val="dk1"/>
-            </a:fontRef>
-          </p:style>
           <p:txBody>
-            <a:bodyPr anchor="ctr"/>
+            <a:bodyPr wrap="square" rtlCol="0">
+              <a:spAutoFit/>
+            </a:bodyPr>
             <a:lstStyle/>
             <a:p>
-              <a:pPr algn="ctr">
-                <a:defRPr/>
-              </a:pPr>
-              <a:endParaRPr lang="en-US" sz="1400" dirty="0">
+              <a:pPr algn="ctr"/>
+              <a:r>
+                <a:rPr lang="de-DE" sz="1200" dirty="0">
+                  <a:latin typeface="Myriad Pro SemiCond" panose="020B0503030403020204" pitchFamily="34" charset="0"/>
+                </a:rPr>
+                <a:t>Traces</a:t>
+              </a:r>
+              <a:endParaRPr lang="en-US" sz="1200" dirty="0">
                 <a:latin typeface="Myriad Pro SemiCond" panose="020B0503030403020204" pitchFamily="34" charset="0"/>
               </a:endParaRPr>
             </a:p>
           </p:txBody>
         </p:sp>
-        <p:pic>
-          <p:nvPicPr>
-            <p:cNvPr id="213" name="Picture 212"/>
-            <p:cNvPicPr>
-              <a:picLocks noChangeAspect="1"/>
-            </p:cNvPicPr>
+        <p:cxnSp>
+          <p:nvCxnSpPr>
+            <p:cNvPr id="182" name="Gerade Verbindung mit Pfeil 97"/>
+            <p:cNvCxnSpPr/>
             <p:nvPr/>
-          </p:nvPicPr>
-          <p:blipFill>
-            <a:blip r:embed="rId9" cstate="print">
-              <a:extLst>
-                <a:ext uri="{28A0092B-C50C-407E-A947-70E740481C1C}">
-                  <a14:useLocalDpi xmlns:a14="http://schemas.microsoft.com/office/drawing/2010/main" val="0"/>
-                </a:ext>
-              </a:extLst>
-            </a:blip>
-            <a:stretch>
-              <a:fillRect/>
-            </a:stretch>
-          </p:blipFill>
+          </p:nvCxnSpPr>
+          <p:spPr>
+            <a:xfrm rot="10800000" flipV="1">
+              <a:off x="4658302" y="4714894"/>
+              <a:ext cx="0" cy="583348"/>
+            </a:xfrm>
+            <a:prstGeom prst="straightConnector1">
+              <a:avLst/>
+            </a:prstGeom>
+            <a:ln w="44450">
+              <a:solidFill>
+                <a:schemeClr val="dk1"/>
+              </a:solidFill>
+              <a:headEnd type="none"/>
+              <a:tailEnd type="triangle"/>
+            </a:ln>
+          </p:spPr>
+          <p:style>
+            <a:lnRef idx="3">
+              <a:schemeClr val="dk1"/>
+            </a:lnRef>
+            <a:fillRef idx="0">
+              <a:schemeClr val="dk1"/>
+            </a:fillRef>
+            <a:effectRef idx="2">
+              <a:schemeClr val="dk1"/>
+            </a:effectRef>
+            <a:fontRef idx="minor">
+              <a:schemeClr val="tx1"/>
+            </a:fontRef>
+          </p:style>
+        </p:cxnSp>
+        <p:sp>
+          <p:nvSpPr>
+            <p:cNvPr id="184" name="TextBox 183"/>
+            <p:cNvSpPr txBox="1"/>
+            <p:nvPr/>
+          </p:nvSpPr>
           <p:spPr>
             <a:xfrm>
-              <a:off x="2629873" y="1269946"/>
-              <a:ext cx="1138854" cy="388953"/>
+              <a:off x="3478198" y="4828937"/>
+              <a:ext cx="1052621" cy="276999"/>
             </a:xfrm>
             <a:prstGeom prst="rect">
               <a:avLst/>
             </a:prstGeom>
+            <a:noFill/>
           </p:spPr>
-        </p:pic>
+          <p:txBody>
+            <a:bodyPr wrap="square" rtlCol="0">
+              <a:spAutoFit/>
+            </a:bodyPr>
+            <a:lstStyle/>
+            <a:p>
+              <a:pPr algn="ctr"/>
+              <a:r>
+                <a:rPr lang="de-DE" sz="1200" dirty="0">
+                  <a:latin typeface="Myriad Pro SemiCond" panose="020B0503030403020204" pitchFamily="34" charset="0"/>
+                </a:rPr>
+                <a:t>Records</a:t>
+              </a:r>
+              <a:endParaRPr lang="en-US" sz="1200" dirty="0">
+                <a:latin typeface="Myriad Pro SemiCond" panose="020B0503030403020204" pitchFamily="34" charset="0"/>
+              </a:endParaRPr>
+            </a:p>
+          </p:txBody>
+        </p:sp>
       </p:grpSp>
-      <p:cxnSp>
-        <p:nvCxnSpPr>
-          <p:cNvPr id="214" name="Gerade Verbindung mit Pfeil 97"/>
-          <p:cNvCxnSpPr/>
-          <p:nvPr/>
-        </p:nvCxnSpPr>
-        <p:spPr>
-          <a:xfrm flipV="1">
-            <a:off x="5830013" y="4714897"/>
-            <a:ext cx="0" cy="583347"/>
-          </a:xfrm>
-          <a:prstGeom prst="straightConnector1">
-            <a:avLst/>
-          </a:prstGeom>
-          <a:ln w="44450">
-            <a:solidFill>
-              <a:schemeClr val="dk1"/>
-            </a:solidFill>
-            <a:headEnd type="none"/>
-            <a:tailEnd type="triangle"/>
-          </a:ln>
-        </p:spPr>
-        <p:style>
-          <a:lnRef idx="3">
-            <a:schemeClr val="dk1"/>
-          </a:lnRef>
-          <a:fillRef idx="0">
-            <a:schemeClr val="dk1"/>
-          </a:fillRef>
-          <a:effectRef idx="2">
-            <a:schemeClr val="dk1"/>
-          </a:effectRef>
-          <a:fontRef idx="minor">
-            <a:schemeClr val="tx1"/>
-          </a:fontRef>
-        </p:style>
-      </p:cxnSp>
-      <p:sp>
-        <p:nvSpPr>
-          <p:cNvPr id="215" name="TextBox 214"/>
-          <p:cNvSpPr txBox="1"/>
-          <p:nvPr/>
-        </p:nvSpPr>
-        <p:spPr>
-          <a:xfrm>
-            <a:off x="5035485" y="4820245"/>
-            <a:ext cx="1052621" cy="276999"/>
-          </a:xfrm>
-          <a:prstGeom prst="rect">
-            <a:avLst/>
-          </a:prstGeom>
-          <a:noFill/>
-        </p:spPr>
-        <p:txBody>
-          <a:bodyPr wrap="square" rtlCol="0">
-            <a:spAutoFit/>
-          </a:bodyPr>
-          <a:lstStyle/>
-          <a:p>
-            <a:pPr algn="ctr"/>
-            <a:r>
-              <a:rPr lang="de-DE" sz="1200" dirty="0">
-                <a:latin typeface="Myriad Pro SemiCond" panose="020B0503030403020204" pitchFamily="34" charset="0"/>
-              </a:rPr>
-              <a:t>Traces</a:t>
-            </a:r>
-            <a:endParaRPr lang="en-US" sz="1200" dirty="0">
-              <a:latin typeface="Myriad Pro SemiCond" panose="020B0503030403020204" pitchFamily="34" charset="0"/>
-            </a:endParaRPr>
-          </a:p>
-        </p:txBody>
-      </p:sp>
-      <p:cxnSp>
-        <p:nvCxnSpPr>
-          <p:cNvPr id="216" name="Gerade Verbindung mit Pfeil 97"/>
-          <p:cNvCxnSpPr>
-            <a:cxnSpLocks/>
-          </p:cNvCxnSpPr>
-          <p:nvPr/>
-        </p:nvCxnSpPr>
-        <p:spPr>
-          <a:xfrm>
-            <a:off x="6111986" y="4733355"/>
-            <a:ext cx="0" cy="564889"/>
-          </a:xfrm>
-          <a:prstGeom prst="straightConnector1">
-            <a:avLst/>
-          </a:prstGeom>
-          <a:ln w="44450">
-            <a:solidFill>
-              <a:schemeClr val="dk1"/>
-            </a:solidFill>
-            <a:headEnd type="none"/>
-            <a:tailEnd type="triangle"/>
-          </a:ln>
-        </p:spPr>
-        <p:style>
-          <a:lnRef idx="3">
-            <a:schemeClr val="dk1"/>
-          </a:lnRef>
-          <a:fillRef idx="0">
-            <a:schemeClr val="dk1"/>
-          </a:fillRef>
-          <a:effectRef idx="2">
-            <a:schemeClr val="dk1"/>
-          </a:effectRef>
-          <a:fontRef idx="minor">
-            <a:schemeClr val="tx1"/>
-          </a:fontRef>
-        </p:style>
-      </p:cxnSp>
-      <p:sp>
-        <p:nvSpPr>
-          <p:cNvPr id="217" name="TextBox 216"/>
-          <p:cNvSpPr txBox="1"/>
-          <p:nvPr/>
-        </p:nvSpPr>
-        <p:spPr>
-          <a:xfrm>
-            <a:off x="6040045" y="4820245"/>
-            <a:ext cx="1052621" cy="276999"/>
-          </a:xfrm>
-          <a:prstGeom prst="rect">
-            <a:avLst/>
-          </a:prstGeom>
-          <a:noFill/>
-        </p:spPr>
-        <p:txBody>
-          <a:bodyPr wrap="square" rtlCol="0">
-            <a:spAutoFit/>
-          </a:bodyPr>
-          <a:lstStyle/>
-          <a:p>
-            <a:pPr algn="ctr"/>
-            <a:r>
-              <a:rPr lang="de-DE" sz="1200" dirty="0">
-                <a:latin typeface="Myriad Pro SemiCond" panose="020B0503030403020204" pitchFamily="34" charset="0"/>
-              </a:rPr>
-              <a:t>Landscapes</a:t>
-            </a:r>
-            <a:endParaRPr lang="en-US" sz="1200" dirty="0">
-              <a:latin typeface="Myriad Pro SemiCond" panose="020B0503030403020204" pitchFamily="34" charset="0"/>
-            </a:endParaRPr>
-          </a:p>
-        </p:txBody>
-      </p:sp>
       <p:grpSp>
         <p:nvGrpSpPr>
           <p:cNvPr id="218" name="Group 217"/>
@@ -4926,8 +4656,8 @@
         </p:nvGrpSpPr>
         <p:grpSpPr>
           <a:xfrm>
-            <a:off x="5272954" y="2032746"/>
-            <a:ext cx="10079749" cy="382937"/>
+            <a:off x="3736628" y="2032746"/>
+            <a:ext cx="11616076" cy="382937"/>
             <a:chOff x="3212188" y="2765458"/>
             <a:chExt cx="4048726" cy="390043"/>
           </a:xfrm>
@@ -5039,7 +4769,7 @@
         </p:nvCxnSpPr>
         <p:spPr>
           <a:xfrm>
-            <a:off x="5955473" y="2415681"/>
+            <a:off x="7567299" y="2400183"/>
             <a:ext cx="0" cy="451134"/>
           </a:xfrm>
           <a:prstGeom prst="straightConnector1">
@@ -5078,672 +4808,8 @@
         </p:nvCxnSpPr>
         <p:spPr>
           <a:xfrm>
-            <a:off x="7387101" y="2415683"/>
+            <a:off x="8998927" y="2400185"/>
             <a:ext cx="0" cy="450799"/>
-          </a:xfrm>
-          <a:prstGeom prst="straightConnector1">
-            <a:avLst/>
-          </a:prstGeom>
-          <a:ln w="44450">
-            <a:solidFill>
-              <a:schemeClr val="dk1"/>
-            </a:solidFill>
-            <a:headEnd type="triangle"/>
-            <a:tailEnd type="triangle"/>
-          </a:ln>
-        </p:spPr>
-        <p:style>
-          <a:lnRef idx="3">
-            <a:schemeClr val="dk1"/>
-          </a:lnRef>
-          <a:fillRef idx="0">
-            <a:schemeClr val="dk1"/>
-          </a:fillRef>
-          <a:effectRef idx="2">
-            <a:schemeClr val="dk1"/>
-          </a:effectRef>
-          <a:fontRef idx="minor">
-            <a:schemeClr val="tx1"/>
-          </a:fontRef>
-        </p:style>
-      </p:cxnSp>
-      <p:sp>
-        <p:nvSpPr>
-          <p:cNvPr id="231" name="Rechteck 94"/>
-          <p:cNvSpPr/>
-          <p:nvPr/>
-        </p:nvSpPr>
-        <p:spPr>
-          <a:xfrm>
-            <a:off x="8135959" y="2869205"/>
-            <a:ext cx="1343743" cy="1864148"/>
-          </a:xfrm>
-          <a:prstGeom prst="rect">
-            <a:avLst/>
-          </a:prstGeom>
-          <a:solidFill>
-            <a:schemeClr val="bg1"/>
-          </a:solidFill>
-          <a:ln w="12700"/>
-        </p:spPr>
-        <p:style>
-          <a:lnRef idx="2">
-            <a:schemeClr val="dk1"/>
-          </a:lnRef>
-          <a:fillRef idx="1">
-            <a:schemeClr val="lt1"/>
-          </a:fillRef>
-          <a:effectRef idx="0">
-            <a:schemeClr val="dk1"/>
-          </a:effectRef>
-          <a:fontRef idx="minor">
-            <a:schemeClr val="dk1"/>
-          </a:fontRef>
-        </p:style>
-        <p:txBody>
-          <a:bodyPr anchor="t"/>
-          <a:lstStyle/>
-          <a:p>
-            <a:pPr algn="ctr"/>
-            <a:r>
-              <a:rPr lang="en-GB" sz="1300" b="1" dirty="0">
-                <a:solidFill>
-                  <a:schemeClr val="tx1"/>
-                </a:solidFill>
-                <a:latin typeface="Myriad Pro SemiCond" panose="020B0503030403020204" pitchFamily="34" charset="0"/>
-              </a:rPr>
-              <a:t>Discovery</a:t>
-            </a:r>
-            <a:endParaRPr lang="en-US" sz="1300" b="1" dirty="0">
-              <a:solidFill>
-                <a:schemeClr val="tx1"/>
-              </a:solidFill>
-              <a:latin typeface="Myriad Pro SemiCond" panose="020B0503030403020204" pitchFamily="34" charset="0"/>
-            </a:endParaRPr>
-          </a:p>
-        </p:txBody>
-      </p:sp>
-      <p:grpSp>
-        <p:nvGrpSpPr>
-          <p:cNvPr id="43" name="Group 42"/>
-          <p:cNvGrpSpPr/>
-          <p:nvPr/>
-        </p:nvGrpSpPr>
-        <p:grpSpPr>
-          <a:xfrm>
-            <a:off x="8225493" y="3647135"/>
-            <a:ext cx="1162693" cy="452716"/>
-            <a:chOff x="4874238" y="1193476"/>
-            <a:chExt cx="1162693" cy="452716"/>
-          </a:xfrm>
-        </p:grpSpPr>
-        <p:sp>
-          <p:nvSpPr>
-            <p:cNvPr id="232" name="Rechteck 94"/>
-            <p:cNvSpPr/>
-            <p:nvPr/>
-          </p:nvSpPr>
-          <p:spPr>
-            <a:xfrm>
-              <a:off x="4874238" y="1193476"/>
-              <a:ext cx="1162693" cy="452716"/>
-            </a:xfrm>
-            <a:prstGeom prst="rect">
-              <a:avLst/>
-            </a:prstGeom>
-            <a:ln w="12700"/>
-          </p:spPr>
-          <p:style>
-            <a:lnRef idx="2">
-              <a:schemeClr val="dk1"/>
-            </a:lnRef>
-            <a:fillRef idx="1">
-              <a:schemeClr val="lt1"/>
-            </a:fillRef>
-            <a:effectRef idx="0">
-              <a:schemeClr val="dk1"/>
-            </a:effectRef>
-            <a:fontRef idx="minor">
-              <a:schemeClr val="dk1"/>
-            </a:fontRef>
-          </p:style>
-          <p:txBody>
-            <a:bodyPr anchor="ctr"/>
-            <a:lstStyle/>
-            <a:p>
-              <a:pPr algn="ctr">
-                <a:defRPr/>
-              </a:pPr>
-              <a:endParaRPr lang="en-US" sz="1400" dirty="0">
-                <a:latin typeface="Myriad Pro SemiCond" panose="020B0503030403020204" pitchFamily="34" charset="0"/>
-              </a:endParaRPr>
-            </a:p>
-          </p:txBody>
-        </p:sp>
-        <p:pic>
-          <p:nvPicPr>
-            <p:cNvPr id="233" name="Picture 232"/>
-            <p:cNvPicPr>
-              <a:picLocks noChangeAspect="1"/>
-            </p:cNvPicPr>
-            <p:nvPr/>
-          </p:nvPicPr>
-          <p:blipFill>
-            <a:blip r:embed="rId9" cstate="print">
-              <a:extLst>
-                <a:ext uri="{28A0092B-C50C-407E-A947-70E740481C1C}">
-                  <a14:useLocalDpi xmlns:a14="http://schemas.microsoft.com/office/drawing/2010/main" val="0"/>
-                </a:ext>
-              </a:extLst>
-            </a:blip>
-            <a:stretch>
-              <a:fillRect/>
-            </a:stretch>
-          </p:blipFill>
-          <p:spPr>
-            <a:xfrm>
-              <a:off x="4886157" y="1225357"/>
-              <a:ext cx="1138854" cy="388953"/>
-            </a:xfrm>
-            <a:prstGeom prst="rect">
-              <a:avLst/>
-            </a:prstGeom>
-          </p:spPr>
-        </p:pic>
-      </p:grpSp>
-      <p:cxnSp>
-        <p:nvCxnSpPr>
-          <p:cNvPr id="234" name="Gerade Verbindung mit Pfeil 97"/>
-          <p:cNvCxnSpPr/>
-          <p:nvPr/>
-        </p:nvCxnSpPr>
-        <p:spPr>
-          <a:xfrm>
-            <a:off x="8817585" y="4733355"/>
-            <a:ext cx="0" cy="564889"/>
-          </a:xfrm>
-          <a:prstGeom prst="straightConnector1">
-            <a:avLst/>
-          </a:prstGeom>
-          <a:ln w="44450">
-            <a:solidFill>
-              <a:schemeClr val="dk1"/>
-            </a:solidFill>
-            <a:headEnd type="triangle"/>
-            <a:tailEnd type="none"/>
-          </a:ln>
-        </p:spPr>
-        <p:style>
-          <a:lnRef idx="3">
-            <a:schemeClr val="dk1"/>
-          </a:lnRef>
-          <a:fillRef idx="0">
-            <a:schemeClr val="dk1"/>
-          </a:fillRef>
-          <a:effectRef idx="2">
-            <a:schemeClr val="dk1"/>
-          </a:effectRef>
-          <a:fontRef idx="minor">
-            <a:schemeClr val="tx1"/>
-          </a:fontRef>
-        </p:style>
-      </p:cxnSp>
-      <p:sp>
-        <p:nvSpPr>
-          <p:cNvPr id="236" name="Rechteck 94"/>
-          <p:cNvSpPr/>
-          <p:nvPr/>
-        </p:nvSpPr>
-        <p:spPr>
-          <a:xfrm>
-            <a:off x="6715232" y="2866482"/>
-            <a:ext cx="1343743" cy="1854821"/>
-          </a:xfrm>
-          <a:prstGeom prst="rect">
-            <a:avLst/>
-          </a:prstGeom>
-          <a:solidFill>
-            <a:schemeClr val="bg1"/>
-          </a:solidFill>
-          <a:ln w="12700"/>
-        </p:spPr>
-        <p:style>
-          <a:lnRef idx="2">
-            <a:schemeClr val="dk1"/>
-          </a:lnRef>
-          <a:fillRef idx="1">
-            <a:schemeClr val="lt1"/>
-          </a:fillRef>
-          <a:effectRef idx="0">
-            <a:schemeClr val="dk1"/>
-          </a:effectRef>
-          <a:fontRef idx="minor">
-            <a:schemeClr val="dk1"/>
-          </a:fontRef>
-        </p:style>
-        <p:txBody>
-          <a:bodyPr anchor="t"/>
-          <a:lstStyle/>
-          <a:p>
-            <a:pPr algn="ctr"/>
-            <a:r>
-              <a:rPr lang="en-GB" sz="1300" b="1" dirty="0">
-                <a:solidFill>
-                  <a:schemeClr val="tx1"/>
-                </a:solidFill>
-                <a:latin typeface="Myriad Pro SemiCond" panose="020B0503030403020204" pitchFamily="34" charset="0"/>
-              </a:rPr>
-              <a:t>User</a:t>
-            </a:r>
-            <a:endParaRPr lang="en-US" sz="1300" b="1" dirty="0">
-              <a:solidFill>
-                <a:schemeClr val="tx1"/>
-              </a:solidFill>
-              <a:latin typeface="Myriad Pro SemiCond" panose="020B0503030403020204" pitchFamily="34" charset="0"/>
-            </a:endParaRPr>
-          </a:p>
-        </p:txBody>
-      </p:sp>
-      <p:grpSp>
-        <p:nvGrpSpPr>
-          <p:cNvPr id="237" name="Group 236"/>
-          <p:cNvGrpSpPr/>
-          <p:nvPr/>
-        </p:nvGrpSpPr>
-        <p:grpSpPr>
-          <a:xfrm>
-            <a:off x="6805756" y="3644489"/>
-            <a:ext cx="1162693" cy="452716"/>
-            <a:chOff x="2629873" y="1232261"/>
-            <a:chExt cx="1162693" cy="452716"/>
-          </a:xfrm>
-        </p:grpSpPr>
-        <p:sp>
-          <p:nvSpPr>
-            <p:cNvPr id="238" name="Rechteck 94"/>
-            <p:cNvSpPr/>
-            <p:nvPr/>
-          </p:nvSpPr>
-          <p:spPr>
-            <a:xfrm>
-              <a:off x="2629873" y="1232261"/>
-              <a:ext cx="1162693" cy="452716"/>
-            </a:xfrm>
-            <a:prstGeom prst="rect">
-              <a:avLst/>
-            </a:prstGeom>
-            <a:ln w="12700"/>
-          </p:spPr>
-          <p:style>
-            <a:lnRef idx="2">
-              <a:schemeClr val="dk1"/>
-            </a:lnRef>
-            <a:fillRef idx="1">
-              <a:schemeClr val="lt1"/>
-            </a:fillRef>
-            <a:effectRef idx="0">
-              <a:schemeClr val="dk1"/>
-            </a:effectRef>
-            <a:fontRef idx="minor">
-              <a:schemeClr val="dk1"/>
-            </a:fontRef>
-          </p:style>
-          <p:txBody>
-            <a:bodyPr anchor="ctr"/>
-            <a:lstStyle/>
-            <a:p>
-              <a:pPr algn="ctr">
-                <a:defRPr/>
-              </a:pPr>
-              <a:endParaRPr lang="en-US" sz="1400" dirty="0">
-                <a:latin typeface="Myriad Pro SemiCond" panose="020B0503030403020204" pitchFamily="34" charset="0"/>
-              </a:endParaRPr>
-            </a:p>
-          </p:txBody>
-        </p:sp>
-        <p:pic>
-          <p:nvPicPr>
-            <p:cNvPr id="239" name="Picture 238"/>
-            <p:cNvPicPr>
-              <a:picLocks noChangeAspect="1"/>
-            </p:cNvPicPr>
-            <p:nvPr/>
-          </p:nvPicPr>
-          <p:blipFill>
-            <a:blip r:embed="rId9" cstate="print">
-              <a:extLst>
-                <a:ext uri="{28A0092B-C50C-407E-A947-70E740481C1C}">
-                  <a14:useLocalDpi xmlns:a14="http://schemas.microsoft.com/office/drawing/2010/main" val="0"/>
-                </a:ext>
-              </a:extLst>
-            </a:blip>
-            <a:stretch>
-              <a:fillRect/>
-            </a:stretch>
-          </p:blipFill>
-          <p:spPr>
-            <a:xfrm>
-              <a:off x="2629873" y="1269946"/>
-              <a:ext cx="1138854" cy="388953"/>
-            </a:xfrm>
-            <a:prstGeom prst="rect">
-              <a:avLst/>
-            </a:prstGeom>
-          </p:spPr>
-        </p:pic>
-      </p:grpSp>
-      <p:sp>
-        <p:nvSpPr>
-          <p:cNvPr id="242" name="Rechteck 94"/>
-          <p:cNvSpPr/>
-          <p:nvPr/>
-        </p:nvSpPr>
-        <p:spPr>
-          <a:xfrm>
-            <a:off x="9564306" y="2869205"/>
-            <a:ext cx="1343743" cy="1864148"/>
-          </a:xfrm>
-          <a:prstGeom prst="rect">
-            <a:avLst/>
-          </a:prstGeom>
-          <a:solidFill>
-            <a:schemeClr val="bg1"/>
-          </a:solidFill>
-          <a:ln w="12700"/>
-        </p:spPr>
-        <p:style>
-          <a:lnRef idx="2">
-            <a:schemeClr val="dk1"/>
-          </a:lnRef>
-          <a:fillRef idx="1">
-            <a:schemeClr val="lt1"/>
-          </a:fillRef>
-          <a:effectRef idx="0">
-            <a:schemeClr val="dk1"/>
-          </a:effectRef>
-          <a:fontRef idx="minor">
-            <a:schemeClr val="dk1"/>
-          </a:fontRef>
-        </p:style>
-        <p:txBody>
-          <a:bodyPr anchor="t"/>
-          <a:lstStyle/>
-          <a:p>
-            <a:pPr algn="ctr"/>
-            <a:endParaRPr lang="en-US" sz="1600" b="1" dirty="0">
-              <a:solidFill>
-                <a:schemeClr val="tx1"/>
-              </a:solidFill>
-              <a:latin typeface="Myriad Pro SemiCond" panose="020B0503030403020204" pitchFamily="34" charset="0"/>
-            </a:endParaRPr>
-          </a:p>
-        </p:txBody>
-      </p:sp>
-      <p:sp>
-        <p:nvSpPr>
-          <p:cNvPr id="243" name="Rechteck 94"/>
-          <p:cNvSpPr/>
-          <p:nvPr/>
-        </p:nvSpPr>
-        <p:spPr>
-          <a:xfrm>
-            <a:off x="9653111" y="2974954"/>
-            <a:ext cx="1343743" cy="1864148"/>
-          </a:xfrm>
-          <a:prstGeom prst="rect">
-            <a:avLst/>
-          </a:prstGeom>
-          <a:solidFill>
-            <a:schemeClr val="bg1"/>
-          </a:solidFill>
-          <a:ln w="12700"/>
-        </p:spPr>
-        <p:style>
-          <a:lnRef idx="2">
-            <a:schemeClr val="dk1"/>
-          </a:lnRef>
-          <a:fillRef idx="1">
-            <a:schemeClr val="lt1"/>
-          </a:fillRef>
-          <a:effectRef idx="0">
-            <a:schemeClr val="dk1"/>
-          </a:effectRef>
-          <a:fontRef idx="minor">
-            <a:schemeClr val="dk1"/>
-          </a:fontRef>
-        </p:style>
-        <p:txBody>
-          <a:bodyPr anchor="t"/>
-          <a:lstStyle/>
-          <a:p>
-            <a:pPr algn="ctr"/>
-            <a:r>
-              <a:rPr lang="en-GB" sz="1300" b="1" dirty="0">
-                <a:solidFill>
-                  <a:schemeClr val="tx1"/>
-                </a:solidFill>
-                <a:latin typeface="Myriad Pro SemiCond" panose="020B0503030403020204" pitchFamily="34" charset="0"/>
-              </a:rPr>
-              <a:t>Backend-Extension</a:t>
-            </a:r>
-            <a:endParaRPr lang="en-US" sz="1300" b="1" dirty="0">
-              <a:solidFill>
-                <a:schemeClr val="tx1"/>
-              </a:solidFill>
-              <a:latin typeface="Myriad Pro SemiCond" panose="020B0503030403020204" pitchFamily="34" charset="0"/>
-            </a:endParaRPr>
-          </a:p>
-        </p:txBody>
-      </p:sp>
-      <p:grpSp>
-        <p:nvGrpSpPr>
-          <p:cNvPr id="245" name="Group 244"/>
-          <p:cNvGrpSpPr/>
-          <p:nvPr/>
-        </p:nvGrpSpPr>
-        <p:grpSpPr>
-          <a:xfrm>
-            <a:off x="9743635" y="3643001"/>
-            <a:ext cx="1162693" cy="452716"/>
-            <a:chOff x="2629873" y="1232261"/>
-            <a:chExt cx="1162693" cy="452716"/>
-          </a:xfrm>
-        </p:grpSpPr>
-        <p:sp>
-          <p:nvSpPr>
-            <p:cNvPr id="246" name="Rechteck 94"/>
-            <p:cNvSpPr/>
-            <p:nvPr/>
-          </p:nvSpPr>
-          <p:spPr>
-            <a:xfrm>
-              <a:off x="2629873" y="1232261"/>
-              <a:ext cx="1162693" cy="452716"/>
-            </a:xfrm>
-            <a:prstGeom prst="rect">
-              <a:avLst/>
-            </a:prstGeom>
-            <a:ln w="12700"/>
-          </p:spPr>
-          <p:style>
-            <a:lnRef idx="2">
-              <a:schemeClr val="dk1"/>
-            </a:lnRef>
-            <a:fillRef idx="1">
-              <a:schemeClr val="lt1"/>
-            </a:fillRef>
-            <a:effectRef idx="0">
-              <a:schemeClr val="dk1"/>
-            </a:effectRef>
-            <a:fontRef idx="minor">
-              <a:schemeClr val="dk1"/>
-            </a:fontRef>
-          </p:style>
-          <p:txBody>
-            <a:bodyPr anchor="ctr"/>
-            <a:lstStyle/>
-            <a:p>
-              <a:pPr algn="ctr">
-                <a:defRPr/>
-              </a:pPr>
-              <a:endParaRPr lang="en-US" sz="1400" dirty="0">
-                <a:latin typeface="Myriad Pro SemiCond" panose="020B0503030403020204" pitchFamily="34" charset="0"/>
-              </a:endParaRPr>
-            </a:p>
-          </p:txBody>
-        </p:sp>
-        <p:pic>
-          <p:nvPicPr>
-            <p:cNvPr id="247" name="Picture 246"/>
-            <p:cNvPicPr>
-              <a:picLocks noChangeAspect="1"/>
-            </p:cNvPicPr>
-            <p:nvPr/>
-          </p:nvPicPr>
-          <p:blipFill>
-            <a:blip r:embed="rId9" cstate="print">
-              <a:extLst>
-                <a:ext uri="{28A0092B-C50C-407E-A947-70E740481C1C}">
-                  <a14:useLocalDpi xmlns:a14="http://schemas.microsoft.com/office/drawing/2010/main" val="0"/>
-                </a:ext>
-              </a:extLst>
-            </a:blip>
-            <a:stretch>
-              <a:fillRect/>
-            </a:stretch>
-          </p:blipFill>
-          <p:spPr>
-            <a:xfrm>
-              <a:off x="2629873" y="1269946"/>
-              <a:ext cx="1138854" cy="388953"/>
-            </a:xfrm>
-            <a:prstGeom prst="rect">
-              <a:avLst/>
-            </a:prstGeom>
-          </p:spPr>
-        </p:pic>
-      </p:grpSp>
-      <p:sp>
-        <p:nvSpPr>
-          <p:cNvPr id="248" name="TextBox 247"/>
-          <p:cNvSpPr txBox="1"/>
-          <p:nvPr/>
-        </p:nvSpPr>
-        <p:spPr>
-          <a:xfrm>
-            <a:off x="7959003" y="4819961"/>
-            <a:ext cx="872093" cy="276999"/>
-          </a:xfrm>
-          <a:prstGeom prst="rect">
-            <a:avLst/>
-          </a:prstGeom>
-          <a:noFill/>
-        </p:spPr>
-        <p:txBody>
-          <a:bodyPr wrap="square" rtlCol="0">
-            <a:spAutoFit/>
-          </a:bodyPr>
-          <a:lstStyle/>
-          <a:p>
-            <a:pPr algn="ctr"/>
-            <a:r>
-              <a:rPr lang="de-DE" sz="1200" dirty="0" err="1">
-                <a:latin typeface="Myriad Pro SemiCond" panose="020B0503030403020204" pitchFamily="34" charset="0"/>
-              </a:rPr>
-              <a:t>Processes</a:t>
-            </a:r>
-            <a:endParaRPr lang="en-US" sz="1200" dirty="0">
-              <a:latin typeface="Myriad Pro SemiCond" panose="020B0503030403020204" pitchFamily="34" charset="0"/>
-            </a:endParaRPr>
-          </a:p>
-        </p:txBody>
-      </p:sp>
-      <p:cxnSp>
-        <p:nvCxnSpPr>
-          <p:cNvPr id="249" name="Gerade Verbindung mit Pfeil 97"/>
-          <p:cNvCxnSpPr>
-            <a:stCxn id="243" idx="2"/>
-          </p:cNvCxnSpPr>
-          <p:nvPr/>
-        </p:nvCxnSpPr>
-        <p:spPr>
-          <a:xfrm flipH="1">
-            <a:off x="10321914" y="4839102"/>
-            <a:ext cx="3066" cy="438304"/>
-          </a:xfrm>
-          <a:prstGeom prst="straightConnector1">
-            <a:avLst/>
-          </a:prstGeom>
-          <a:ln w="44450">
-            <a:solidFill>
-              <a:schemeClr val="dk1"/>
-            </a:solidFill>
-            <a:headEnd type="triangle"/>
-            <a:tailEnd type="triangle"/>
-          </a:ln>
-        </p:spPr>
-        <p:style>
-          <a:lnRef idx="3">
-            <a:schemeClr val="dk1"/>
-          </a:lnRef>
-          <a:fillRef idx="0">
-            <a:schemeClr val="dk1"/>
-          </a:fillRef>
-          <a:effectRef idx="2">
-            <a:schemeClr val="dk1"/>
-          </a:effectRef>
-          <a:fontRef idx="minor">
-            <a:schemeClr val="tx1"/>
-          </a:fontRef>
-        </p:style>
-      </p:cxnSp>
-      <p:sp>
-        <p:nvSpPr>
-          <p:cNvPr id="250" name="TextBox 249"/>
-          <p:cNvSpPr txBox="1"/>
-          <p:nvPr/>
-        </p:nvSpPr>
-        <p:spPr>
-          <a:xfrm>
-            <a:off x="9496840" y="4821181"/>
-            <a:ext cx="1052621" cy="276999"/>
-          </a:xfrm>
-          <a:prstGeom prst="rect">
-            <a:avLst/>
-          </a:prstGeom>
-          <a:noFill/>
-        </p:spPr>
-        <p:txBody>
-          <a:bodyPr wrap="square" rtlCol="0">
-            <a:spAutoFit/>
-          </a:bodyPr>
-          <a:lstStyle/>
-          <a:p>
-            <a:pPr algn="ctr"/>
-            <a:r>
-              <a:rPr lang="de-DE" sz="1200" dirty="0">
-                <a:latin typeface="Myriad Pro SemiCond" panose="020B0503030403020204" pitchFamily="34" charset="0"/>
-              </a:rPr>
-              <a:t>Data</a:t>
-            </a:r>
-            <a:endParaRPr lang="en-US" sz="1200" dirty="0">
-              <a:latin typeface="Myriad Pro SemiCond" panose="020B0503030403020204" pitchFamily="34" charset="0"/>
-            </a:endParaRPr>
-          </a:p>
-        </p:txBody>
-      </p:sp>
-      <p:cxnSp>
-        <p:nvCxnSpPr>
-          <p:cNvPr id="251" name="Gerade Verbindung mit Pfeil 97"/>
-          <p:cNvCxnSpPr>
-            <a:endCxn id="231" idx="0"/>
-          </p:cNvCxnSpPr>
-          <p:nvPr/>
-        </p:nvCxnSpPr>
-        <p:spPr>
-          <a:xfrm>
-            <a:off x="8807828" y="2415681"/>
-            <a:ext cx="0" cy="453524"/>
           </a:xfrm>
           <a:prstGeom prst="straightConnector1">
             <a:avLst/>
@@ -5773,222 +4839,16 @@
       </p:cxnSp>
       <p:cxnSp>
         <p:nvCxnSpPr>
-          <p:cNvPr id="252" name="Gerade Verbindung mit Pfeil 97"/>
+          <p:cNvPr id="251" name="Gerade Verbindung mit Pfeil 97"/>
           <p:cNvCxnSpPr>
-            <a:endCxn id="242" idx="0"/>
+            <a:endCxn id="231" idx="0"/>
           </p:cNvCxnSpPr>
           <p:nvPr/>
         </p:nvCxnSpPr>
         <p:spPr>
           <a:xfrm>
-            <a:off x="10236175" y="2415681"/>
+            <a:off x="10419654" y="2400183"/>
             <a:ext cx="0" cy="453524"/>
-          </a:xfrm>
-          <a:prstGeom prst="straightConnector1">
-            <a:avLst/>
-          </a:prstGeom>
-          <a:ln w="44450">
-            <a:solidFill>
-              <a:schemeClr val="dk1"/>
-            </a:solidFill>
-            <a:headEnd type="triangle"/>
-            <a:tailEnd type="triangle"/>
-          </a:ln>
-        </p:spPr>
-        <p:style>
-          <a:lnRef idx="3">
-            <a:schemeClr val="dk1"/>
-          </a:lnRef>
-          <a:fillRef idx="0">
-            <a:schemeClr val="dk1"/>
-          </a:fillRef>
-          <a:effectRef idx="2">
-            <a:schemeClr val="dk1"/>
-          </a:effectRef>
-          <a:fontRef idx="minor">
-            <a:schemeClr val="tx1"/>
-          </a:fontRef>
-        </p:style>
-      </p:cxnSp>
-      <p:sp>
-        <p:nvSpPr>
-          <p:cNvPr id="134" name="Rechteck 94"/>
-          <p:cNvSpPr/>
-          <p:nvPr/>
-        </p:nvSpPr>
-        <p:spPr>
-          <a:xfrm>
-            <a:off x="8266322" y="460262"/>
-            <a:ext cx="4063659" cy="1176483"/>
-          </a:xfrm>
-          <a:prstGeom prst="rect">
-            <a:avLst/>
-          </a:prstGeom>
-          <a:solidFill>
-            <a:schemeClr val="bg1"/>
-          </a:solidFill>
-          <a:ln w="12700"/>
-        </p:spPr>
-        <p:style>
-          <a:lnRef idx="2">
-            <a:schemeClr val="dk1"/>
-          </a:lnRef>
-          <a:fillRef idx="1">
-            <a:schemeClr val="lt1"/>
-          </a:fillRef>
-          <a:effectRef idx="0">
-            <a:schemeClr val="dk1"/>
-          </a:effectRef>
-          <a:fontRef idx="minor">
-            <a:schemeClr val="dk1"/>
-          </a:fontRef>
-        </p:style>
-        <p:txBody>
-          <a:bodyPr anchor="t"/>
-          <a:lstStyle/>
-          <a:p>
-            <a:pPr algn="ctr"/>
-            <a:r>
-              <a:rPr lang="de-DE" sz="1300" b="1" dirty="0">
-                <a:solidFill>
-                  <a:schemeClr val="tx1"/>
-                </a:solidFill>
-                <a:latin typeface="Myriad Pro SemiCond" panose="020B0503030403020204" pitchFamily="34" charset="0"/>
-              </a:rPr>
-              <a:t>Frontend</a:t>
-            </a:r>
-            <a:endParaRPr lang="en-US" sz="1300" b="1" dirty="0">
-              <a:solidFill>
-                <a:schemeClr val="tx1"/>
-              </a:solidFill>
-              <a:latin typeface="Myriad Pro SemiCond" panose="020B0503030403020204" pitchFamily="34" charset="0"/>
-            </a:endParaRPr>
-          </a:p>
-        </p:txBody>
-      </p:sp>
-      <p:sp>
-        <p:nvSpPr>
-          <p:cNvPr id="255" name="TextBox 254"/>
-          <p:cNvSpPr txBox="1"/>
-          <p:nvPr/>
-        </p:nvSpPr>
-        <p:spPr>
-          <a:xfrm>
-            <a:off x="9485220" y="1702623"/>
-            <a:ext cx="1052621" cy="276999"/>
-          </a:xfrm>
-          <a:prstGeom prst="rect">
-            <a:avLst/>
-          </a:prstGeom>
-          <a:noFill/>
-        </p:spPr>
-        <p:txBody>
-          <a:bodyPr wrap="square" rtlCol="0">
-            <a:spAutoFit/>
-          </a:bodyPr>
-          <a:lstStyle/>
-          <a:p>
-            <a:pPr algn="ctr"/>
-            <a:r>
-              <a:rPr lang="de-DE" sz="1200" dirty="0">
-                <a:latin typeface="Myriad Pro SemiCond" panose="020B0503030403020204" pitchFamily="34" charset="0"/>
-              </a:rPr>
-              <a:t>HTTP</a:t>
-            </a:r>
-            <a:endParaRPr lang="en-US" sz="1200" dirty="0">
-              <a:latin typeface="Myriad Pro SemiCond" panose="020B0503030403020204" pitchFamily="34" charset="0"/>
-            </a:endParaRPr>
-          </a:p>
-        </p:txBody>
-      </p:sp>
-      <p:cxnSp>
-        <p:nvCxnSpPr>
-          <p:cNvPr id="256" name="Gerade Verbindung mit Pfeil 97"/>
-          <p:cNvCxnSpPr>
-            <a:stCxn id="134" idx="1"/>
-            <a:endCxn id="155" idx="3"/>
-          </p:cNvCxnSpPr>
-          <p:nvPr/>
-        </p:nvCxnSpPr>
-        <p:spPr>
-          <a:xfrm flipH="1" flipV="1">
-            <a:off x="5296645" y="1040707"/>
-            <a:ext cx="2969677" cy="7796"/>
-          </a:xfrm>
-          <a:prstGeom prst="straightConnector1">
-            <a:avLst/>
-          </a:prstGeom>
-          <a:ln w="44450">
-            <a:solidFill>
-              <a:schemeClr val="dk1"/>
-            </a:solidFill>
-            <a:headEnd type="triangle"/>
-            <a:tailEnd type="triangle"/>
-          </a:ln>
-        </p:spPr>
-        <p:style>
-          <a:lnRef idx="3">
-            <a:schemeClr val="dk1"/>
-          </a:lnRef>
-          <a:fillRef idx="0">
-            <a:schemeClr val="dk1"/>
-          </a:fillRef>
-          <a:effectRef idx="2">
-            <a:schemeClr val="dk1"/>
-          </a:effectRef>
-          <a:fontRef idx="minor">
-            <a:schemeClr val="tx1"/>
-          </a:fontRef>
-        </p:style>
-      </p:cxnSp>
-      <p:sp>
-        <p:nvSpPr>
-          <p:cNvPr id="257" name="TextBox 256"/>
-          <p:cNvSpPr txBox="1"/>
-          <p:nvPr/>
-        </p:nvSpPr>
-        <p:spPr>
-          <a:xfrm>
-            <a:off x="5178894" y="703050"/>
-            <a:ext cx="1052621" cy="276999"/>
-          </a:xfrm>
-          <a:prstGeom prst="rect">
-            <a:avLst/>
-          </a:prstGeom>
-          <a:noFill/>
-        </p:spPr>
-        <p:txBody>
-          <a:bodyPr wrap="square" rtlCol="0">
-            <a:spAutoFit/>
-          </a:bodyPr>
-          <a:lstStyle/>
-          <a:p>
-            <a:pPr algn="ctr"/>
-            <a:r>
-              <a:rPr lang="de-DE" sz="1200" dirty="0">
-                <a:latin typeface="Myriad Pro SemiCond" panose="020B0503030403020204" pitchFamily="34" charset="0"/>
-              </a:rPr>
-              <a:t>HTTP</a:t>
-            </a:r>
-            <a:endParaRPr lang="en-US" sz="1200" dirty="0">
-              <a:latin typeface="Myriad Pro SemiCond" panose="020B0503030403020204" pitchFamily="34" charset="0"/>
-            </a:endParaRPr>
-          </a:p>
-        </p:txBody>
-      </p:sp>
-      <p:cxnSp>
-        <p:nvCxnSpPr>
-          <p:cNvPr id="258" name="Gerade Verbindung mit Pfeil 97"/>
-          <p:cNvCxnSpPr>
-            <a:cxnSpLocks/>
-            <a:endCxn id="219" idx="0"/>
-          </p:cNvCxnSpPr>
-          <p:nvPr/>
-        </p:nvCxnSpPr>
-        <p:spPr>
-          <a:xfrm>
-            <a:off x="10322330" y="1636745"/>
-            <a:ext cx="0" cy="396001"/>
           </a:xfrm>
           <a:prstGeom prst="straightConnector1">
             <a:avLst/>
@@ -6018,32 +4878,35 @@
       </p:cxnSp>
       <p:grpSp>
         <p:nvGrpSpPr>
-          <p:cNvPr id="89" name="Group 88"/>
+          <p:cNvPr id="6" name="Group 5"/>
           <p:cNvGrpSpPr/>
           <p:nvPr/>
         </p:nvGrpSpPr>
         <p:grpSpPr>
           <a:xfrm>
-            <a:off x="10925874" y="792822"/>
-            <a:ext cx="1221148" cy="631019"/>
-            <a:chOff x="8877128" y="4325992"/>
-            <a:chExt cx="1221148" cy="631019"/>
+            <a:off x="3686347" y="2394314"/>
+            <a:ext cx="1500014" cy="2896181"/>
+            <a:chOff x="9496840" y="2415681"/>
+            <a:chExt cx="1500014" cy="2896181"/>
           </a:xfrm>
         </p:grpSpPr>
         <p:sp>
           <p:nvSpPr>
-            <p:cNvPr id="90" name="Rechteck 148"/>
+            <p:cNvPr id="242" name="Rechteck 94"/>
             <p:cNvSpPr/>
             <p:nvPr/>
           </p:nvSpPr>
           <p:spPr>
             <a:xfrm>
-              <a:off x="8877128" y="4325992"/>
-              <a:ext cx="1221148" cy="631019"/>
+              <a:off x="9564306" y="2869205"/>
+              <a:ext cx="1343743" cy="1864148"/>
             </a:xfrm>
             <a:prstGeom prst="rect">
               <a:avLst/>
             </a:prstGeom>
+            <a:solidFill>
+              <a:schemeClr val="bg1"/>
+            </a:solidFill>
             <a:ln w="12700"/>
           </p:spPr>
           <p:style>
@@ -6061,77 +4924,36 @@
             </a:fontRef>
           </p:style>
           <p:txBody>
-            <a:bodyPr anchor="ctr"/>
+            <a:bodyPr anchor="t"/>
             <a:lstStyle/>
             <a:p>
-              <a:pPr algn="ctr" eaLnBrk="1" hangingPunct="1">
-                <a:defRPr/>
-              </a:pPr>
-              <a:endParaRPr lang="en-US" sz="1400" dirty="0">
+              <a:pPr algn="ctr"/>
+              <a:endParaRPr lang="en-US" sz="1600" b="1" dirty="0">
+                <a:solidFill>
+                  <a:schemeClr val="tx1"/>
+                </a:solidFill>
                 <a:latin typeface="Myriad Pro SemiCond" panose="020B0503030403020204" pitchFamily="34" charset="0"/>
               </a:endParaRPr>
             </a:p>
           </p:txBody>
         </p:sp>
-        <p:pic>
-          <p:nvPicPr>
-            <p:cNvPr id="92" name="Picture 91"/>
-            <p:cNvPicPr>
-              <a:picLocks noChangeAspect="1"/>
-            </p:cNvPicPr>
-            <p:nvPr/>
-          </p:nvPicPr>
-          <p:blipFill>
-            <a:blip r:embed="rId10" cstate="print">
-              <a:extLst>
-                <a:ext uri="{28A0092B-C50C-407E-A947-70E740481C1C}">
-                  <a14:useLocalDpi xmlns:a14="http://schemas.microsoft.com/office/drawing/2010/main" val="0"/>
-                </a:ext>
-              </a:extLst>
-            </a:blip>
-            <a:stretch>
-              <a:fillRect/>
-            </a:stretch>
-          </p:blipFill>
-          <p:spPr>
-            <a:xfrm>
-              <a:off x="9025843" y="4350138"/>
-              <a:ext cx="915264" cy="560680"/>
-            </a:xfrm>
-            <a:prstGeom prst="rect">
-              <a:avLst/>
-            </a:prstGeom>
-          </p:spPr>
-        </p:pic>
-      </p:grpSp>
-      <p:grpSp>
-        <p:nvGrpSpPr>
-          <p:cNvPr id="5" name="Group 4"/>
-          <p:cNvGrpSpPr/>
-          <p:nvPr/>
-        </p:nvGrpSpPr>
-        <p:grpSpPr>
-          <a:xfrm>
-            <a:off x="6799361" y="4181004"/>
-            <a:ext cx="1162693" cy="452716"/>
-            <a:chOff x="6211561" y="4070976"/>
-            <a:chExt cx="1162693" cy="452716"/>
-          </a:xfrm>
-        </p:grpSpPr>
         <p:sp>
           <p:nvSpPr>
-            <p:cNvPr id="240" name="Rechteck 94"/>
+            <p:cNvPr id="243" name="Rechteck 94"/>
             <p:cNvSpPr/>
             <p:nvPr/>
           </p:nvSpPr>
           <p:spPr>
             <a:xfrm>
-              <a:off x="6211561" y="4070976"/>
-              <a:ext cx="1162693" cy="452716"/>
+              <a:off x="9653111" y="2974954"/>
+              <a:ext cx="1343743" cy="1864148"/>
             </a:xfrm>
             <a:prstGeom prst="rect">
               <a:avLst/>
             </a:prstGeom>
+            <a:solidFill>
+              <a:schemeClr val="bg1"/>
+            </a:solidFill>
             <a:ln w="12700"/>
           </p:spPr>
           <p:style>
@@ -6149,49 +4971,381 @@
             </a:fontRef>
           </p:style>
           <p:txBody>
-            <a:bodyPr anchor="ctr"/>
+            <a:bodyPr anchor="t"/>
             <a:lstStyle/>
             <a:p>
-              <a:pPr algn="ctr">
-                <a:defRPr/>
-              </a:pPr>
-              <a:endParaRPr lang="en-US" sz="1400" dirty="0">
+              <a:pPr algn="ctr"/>
+              <a:r>
+                <a:rPr lang="en-GB" sz="1300" b="1" dirty="0">
+                  <a:solidFill>
+                    <a:schemeClr val="tx1"/>
+                  </a:solidFill>
+                  <a:latin typeface="Myriad Pro SemiCond" panose="020B0503030403020204" pitchFamily="34" charset="0"/>
+                </a:rPr>
+                <a:t>Backend-Extension</a:t>
+              </a:r>
+              <a:endParaRPr lang="en-US" sz="1300" b="1" dirty="0">
+                <a:solidFill>
+                  <a:schemeClr val="tx1"/>
+                </a:solidFill>
                 <a:latin typeface="Myriad Pro SemiCond" panose="020B0503030403020204" pitchFamily="34" charset="0"/>
               </a:endParaRPr>
             </a:p>
           </p:txBody>
         </p:sp>
-        <p:pic>
-          <p:nvPicPr>
-            <p:cNvPr id="100" name="Picture 99"/>
-            <p:cNvPicPr>
-              <a:picLocks noChangeAspect="1"/>
-            </p:cNvPicPr>
+        <p:grpSp>
+          <p:nvGrpSpPr>
+            <p:cNvPr id="245" name="Group 244"/>
+            <p:cNvGrpSpPr/>
             <p:nvPr/>
-          </p:nvPicPr>
-          <p:blipFill>
-            <a:blip r:embed="rId11" cstate="print">
-              <a:extLst>
-                <a:ext uri="{28A0092B-C50C-407E-A947-70E740481C1C}">
-                  <a14:useLocalDpi xmlns:a14="http://schemas.microsoft.com/office/drawing/2010/main" val="0"/>
-                </a:ext>
-              </a:extLst>
-            </a:blip>
-            <a:stretch>
-              <a:fillRect/>
-            </a:stretch>
-          </p:blipFill>
+          </p:nvGrpSpPr>
+          <p:grpSpPr>
+            <a:xfrm>
+              <a:off x="9743635" y="3643001"/>
+              <a:ext cx="1162693" cy="452716"/>
+              <a:chOff x="2629873" y="1232261"/>
+              <a:chExt cx="1162693" cy="452716"/>
+            </a:xfrm>
+          </p:grpSpPr>
+          <p:sp>
+            <p:nvSpPr>
+              <p:cNvPr id="246" name="Rechteck 94"/>
+              <p:cNvSpPr/>
+              <p:nvPr/>
+            </p:nvSpPr>
+            <p:spPr>
+              <a:xfrm>
+                <a:off x="2629873" y="1232261"/>
+                <a:ext cx="1162693" cy="452716"/>
+              </a:xfrm>
+              <a:prstGeom prst="rect">
+                <a:avLst/>
+              </a:prstGeom>
+              <a:ln w="12700"/>
+            </p:spPr>
+            <p:style>
+              <a:lnRef idx="2">
+                <a:schemeClr val="dk1"/>
+              </a:lnRef>
+              <a:fillRef idx="1">
+                <a:schemeClr val="lt1"/>
+              </a:fillRef>
+              <a:effectRef idx="0">
+                <a:schemeClr val="dk1"/>
+              </a:effectRef>
+              <a:fontRef idx="minor">
+                <a:schemeClr val="dk1"/>
+              </a:fontRef>
+            </p:style>
+            <p:txBody>
+              <a:bodyPr anchor="ctr"/>
+              <a:lstStyle/>
+              <a:p>
+                <a:pPr algn="ctr">
+                  <a:defRPr/>
+                </a:pPr>
+                <a:endParaRPr lang="en-US" sz="1400" dirty="0">
+                  <a:latin typeface="Myriad Pro SemiCond" panose="020B0503030403020204" pitchFamily="34" charset="0"/>
+                </a:endParaRPr>
+              </a:p>
+            </p:txBody>
+          </p:sp>
+          <p:pic>
+            <p:nvPicPr>
+              <p:cNvPr id="247" name="Picture 246"/>
+              <p:cNvPicPr>
+                <a:picLocks noChangeAspect="1"/>
+              </p:cNvPicPr>
+              <p:nvPr/>
+            </p:nvPicPr>
+            <p:blipFill>
+              <a:blip r:embed="rId9" cstate="print">
+                <a:extLst>
+                  <a:ext uri="{28A0092B-C50C-407E-A947-70E740481C1C}">
+                    <a14:useLocalDpi xmlns:a14="http://schemas.microsoft.com/office/drawing/2010/main" val="0"/>
+                  </a:ext>
+                </a:extLst>
+              </a:blip>
+              <a:stretch>
+                <a:fillRect/>
+              </a:stretch>
+            </p:blipFill>
+            <p:spPr>
+              <a:xfrm>
+                <a:off x="2629873" y="1269946"/>
+                <a:ext cx="1138854" cy="388953"/>
+              </a:xfrm>
+              <a:prstGeom prst="rect">
+                <a:avLst/>
+              </a:prstGeom>
+            </p:spPr>
+          </p:pic>
+        </p:grpSp>
+        <p:cxnSp>
+          <p:nvCxnSpPr>
+            <p:cNvPr id="249" name="Gerade Verbindung mit Pfeil 97"/>
+            <p:cNvCxnSpPr>
+              <a:stCxn id="243" idx="2"/>
+            </p:cNvCxnSpPr>
+            <p:nvPr/>
+          </p:nvCxnSpPr>
+          <p:spPr>
+            <a:xfrm flipH="1">
+              <a:off x="10319667" y="4839102"/>
+              <a:ext cx="5316" cy="472760"/>
+            </a:xfrm>
+            <a:prstGeom prst="straightConnector1">
+              <a:avLst/>
+            </a:prstGeom>
+            <a:ln w="44450">
+              <a:solidFill>
+                <a:schemeClr val="dk1"/>
+              </a:solidFill>
+              <a:headEnd type="triangle"/>
+              <a:tailEnd type="triangle"/>
+            </a:ln>
+          </p:spPr>
+          <p:style>
+            <a:lnRef idx="3">
+              <a:schemeClr val="dk1"/>
+            </a:lnRef>
+            <a:fillRef idx="0">
+              <a:schemeClr val="dk1"/>
+            </a:fillRef>
+            <a:effectRef idx="2">
+              <a:schemeClr val="dk1"/>
+            </a:effectRef>
+            <a:fontRef idx="minor">
+              <a:schemeClr val="tx1"/>
+            </a:fontRef>
+          </p:style>
+        </p:cxnSp>
+        <p:sp>
+          <p:nvSpPr>
+            <p:cNvPr id="250" name="TextBox 249"/>
+            <p:cNvSpPr txBox="1"/>
+            <p:nvPr/>
+          </p:nvSpPr>
           <p:spPr>
             <a:xfrm>
-              <a:off x="6286684" y="4160526"/>
-              <a:ext cx="1025235" cy="270640"/>
+              <a:off x="9496840" y="4821181"/>
+              <a:ext cx="1052621" cy="276999"/>
             </a:xfrm>
             <a:prstGeom prst="rect">
               <a:avLst/>
             </a:prstGeom>
+            <a:noFill/>
           </p:spPr>
-        </p:pic>
+          <p:txBody>
+            <a:bodyPr wrap="square" rtlCol="0">
+              <a:spAutoFit/>
+            </a:bodyPr>
+            <a:lstStyle/>
+            <a:p>
+              <a:pPr algn="ctr"/>
+              <a:r>
+                <a:rPr lang="de-DE" sz="1200" dirty="0">
+                  <a:latin typeface="Myriad Pro SemiCond" panose="020B0503030403020204" pitchFamily="34" charset="0"/>
+                </a:rPr>
+                <a:t>Data</a:t>
+              </a:r>
+              <a:endParaRPr lang="en-US" sz="1200" dirty="0">
+                <a:latin typeface="Myriad Pro SemiCond" panose="020B0503030403020204" pitchFamily="34" charset="0"/>
+              </a:endParaRPr>
+            </a:p>
+          </p:txBody>
+        </p:sp>
+        <p:cxnSp>
+          <p:nvCxnSpPr>
+            <p:cNvPr id="252" name="Gerade Verbindung mit Pfeil 97"/>
+            <p:cNvCxnSpPr>
+              <a:endCxn id="242" idx="0"/>
+            </p:cNvCxnSpPr>
+            <p:nvPr/>
+          </p:nvCxnSpPr>
+          <p:spPr>
+            <a:xfrm>
+              <a:off x="10236175" y="2415681"/>
+              <a:ext cx="0" cy="453524"/>
+            </a:xfrm>
+            <a:prstGeom prst="straightConnector1">
+              <a:avLst/>
+            </a:prstGeom>
+            <a:ln w="44450">
+              <a:solidFill>
+                <a:schemeClr val="dk1"/>
+              </a:solidFill>
+              <a:headEnd type="triangle"/>
+              <a:tailEnd type="triangle"/>
+            </a:ln>
+          </p:spPr>
+          <p:style>
+            <a:lnRef idx="3">
+              <a:schemeClr val="dk1"/>
+            </a:lnRef>
+            <a:fillRef idx="0">
+              <a:schemeClr val="dk1"/>
+            </a:fillRef>
+            <a:effectRef idx="2">
+              <a:schemeClr val="dk1"/>
+            </a:effectRef>
+            <a:fontRef idx="minor">
+              <a:schemeClr val="tx1"/>
+            </a:fontRef>
+          </p:style>
+        </p:cxnSp>
       </p:grpSp>
+      <p:sp>
+        <p:nvSpPr>
+          <p:cNvPr id="255" name="TextBox 254"/>
+          <p:cNvSpPr txBox="1"/>
+          <p:nvPr/>
+        </p:nvSpPr>
+        <p:spPr>
+          <a:xfrm>
+            <a:off x="8749050" y="1694874"/>
+            <a:ext cx="1052621" cy="276999"/>
+          </a:xfrm>
+          <a:prstGeom prst="rect">
+            <a:avLst/>
+          </a:prstGeom>
+          <a:noFill/>
+        </p:spPr>
+        <p:txBody>
+          <a:bodyPr wrap="square" rtlCol="0">
+            <a:spAutoFit/>
+          </a:bodyPr>
+          <a:lstStyle/>
+          <a:p>
+            <a:pPr algn="ctr"/>
+            <a:r>
+              <a:rPr lang="de-DE" sz="1200" dirty="0">
+                <a:latin typeface="Myriad Pro SemiCond" panose="020B0503030403020204" pitchFamily="34" charset="0"/>
+              </a:rPr>
+              <a:t>HTTP</a:t>
+            </a:r>
+            <a:endParaRPr lang="en-US" sz="1200" dirty="0">
+              <a:latin typeface="Myriad Pro SemiCond" panose="020B0503030403020204" pitchFamily="34" charset="0"/>
+            </a:endParaRPr>
+          </a:p>
+        </p:txBody>
+      </p:sp>
+      <p:cxnSp>
+        <p:nvCxnSpPr>
+          <p:cNvPr id="256" name="Gerade Verbindung mit Pfeil 97"/>
+          <p:cNvCxnSpPr>
+            <a:stCxn id="134" idx="1"/>
+            <a:endCxn id="155" idx="3"/>
+          </p:cNvCxnSpPr>
+          <p:nvPr/>
+        </p:nvCxnSpPr>
+        <p:spPr>
+          <a:xfrm flipH="1" flipV="1">
+            <a:off x="5203200" y="1040708"/>
+            <a:ext cx="2311455" cy="7796"/>
+          </a:xfrm>
+          <a:prstGeom prst="straightConnector1">
+            <a:avLst/>
+          </a:prstGeom>
+          <a:ln w="44450">
+            <a:solidFill>
+              <a:schemeClr val="dk1"/>
+            </a:solidFill>
+            <a:headEnd type="triangle"/>
+            <a:tailEnd type="triangle"/>
+          </a:ln>
+        </p:spPr>
+        <p:style>
+          <a:lnRef idx="3">
+            <a:schemeClr val="dk1"/>
+          </a:lnRef>
+          <a:fillRef idx="0">
+            <a:schemeClr val="dk1"/>
+          </a:fillRef>
+          <a:effectRef idx="2">
+            <a:schemeClr val="dk1"/>
+          </a:effectRef>
+          <a:fontRef idx="minor">
+            <a:schemeClr val="tx1"/>
+          </a:fontRef>
+        </p:style>
+      </p:cxnSp>
+      <p:sp>
+        <p:nvSpPr>
+          <p:cNvPr id="257" name="TextBox 256"/>
+          <p:cNvSpPr txBox="1"/>
+          <p:nvPr/>
+        </p:nvSpPr>
+        <p:spPr>
+          <a:xfrm>
+            <a:off x="5178894" y="703050"/>
+            <a:ext cx="1052621" cy="276999"/>
+          </a:xfrm>
+          <a:prstGeom prst="rect">
+            <a:avLst/>
+          </a:prstGeom>
+          <a:noFill/>
+        </p:spPr>
+        <p:txBody>
+          <a:bodyPr wrap="square" rtlCol="0">
+            <a:spAutoFit/>
+          </a:bodyPr>
+          <a:lstStyle/>
+          <a:p>
+            <a:pPr algn="ctr"/>
+            <a:r>
+              <a:rPr lang="de-DE" sz="1200" dirty="0">
+                <a:latin typeface="Myriad Pro SemiCond" panose="020B0503030403020204" pitchFamily="34" charset="0"/>
+              </a:rPr>
+              <a:t>HTTP</a:t>
+            </a:r>
+            <a:endParaRPr lang="en-US" sz="1200" dirty="0">
+              <a:latin typeface="Myriad Pro SemiCond" panose="020B0503030403020204" pitchFamily="34" charset="0"/>
+            </a:endParaRPr>
+          </a:p>
+        </p:txBody>
+      </p:sp>
+      <p:cxnSp>
+        <p:nvCxnSpPr>
+          <p:cNvPr id="258" name="Gerade Verbindung mit Pfeil 97"/>
+          <p:cNvCxnSpPr>
+            <a:cxnSpLocks/>
+            <a:stCxn id="134" idx="2"/>
+            <a:endCxn id="220" idx="0"/>
+          </p:cNvCxnSpPr>
+          <p:nvPr/>
+        </p:nvCxnSpPr>
+        <p:spPr>
+          <a:xfrm flipH="1">
+            <a:off x="9544666" y="1636745"/>
+            <a:ext cx="1819" cy="407893"/>
+          </a:xfrm>
+          <a:prstGeom prst="straightConnector1">
+            <a:avLst/>
+          </a:prstGeom>
+          <a:ln w="44450">
+            <a:solidFill>
+              <a:schemeClr val="dk1"/>
+            </a:solidFill>
+            <a:headEnd type="triangle"/>
+            <a:tailEnd type="triangle"/>
+          </a:ln>
+        </p:spPr>
+        <p:style>
+          <a:lnRef idx="3">
+            <a:schemeClr val="dk1"/>
+          </a:lnRef>
+          <a:fillRef idx="0">
+            <a:schemeClr val="dk1"/>
+          </a:fillRef>
+          <a:effectRef idx="2">
+            <a:schemeClr val="dk1"/>
+          </a:effectRef>
+          <a:fontRef idx="minor">
+            <a:schemeClr val="tx1"/>
+          </a:fontRef>
+        </p:style>
+      </p:cxnSp>
       <p:cxnSp>
         <p:nvCxnSpPr>
           <p:cNvPr id="101" name="Straight Arrow Connector 170"/>
@@ -6231,32 +5385,35 @@
       </p:cxnSp>
       <p:grpSp>
         <p:nvGrpSpPr>
-          <p:cNvPr id="102" name="Group 101"/>
+          <p:cNvPr id="15" name="Group 14"/>
           <p:cNvGrpSpPr/>
           <p:nvPr/>
         </p:nvGrpSpPr>
         <p:grpSpPr>
           <a:xfrm>
-            <a:off x="8378140" y="738090"/>
-            <a:ext cx="2262561" cy="763249"/>
-            <a:chOff x="1458906" y="522960"/>
-            <a:chExt cx="2297573" cy="763249"/>
+            <a:off x="7514655" y="460262"/>
+            <a:ext cx="4063659" cy="1176483"/>
+            <a:chOff x="8266322" y="460262"/>
+            <a:chExt cx="4063659" cy="1176483"/>
           </a:xfrm>
         </p:grpSpPr>
         <p:sp>
           <p:nvSpPr>
-            <p:cNvPr id="103" name="Rechteck 147"/>
+            <p:cNvPr id="134" name="Rechteck 94"/>
             <p:cNvSpPr/>
             <p:nvPr/>
           </p:nvSpPr>
           <p:spPr>
             <a:xfrm>
-              <a:off x="1458906" y="522960"/>
-              <a:ext cx="2297573" cy="763249"/>
+              <a:off x="8266322" y="460262"/>
+              <a:ext cx="4063659" cy="1176483"/>
             </a:xfrm>
             <a:prstGeom prst="rect">
               <a:avLst/>
             </a:prstGeom>
+            <a:solidFill>
+              <a:schemeClr val="bg1"/>
+            </a:solidFill>
             <a:ln w="12700"/>
           </p:spPr>
           <p:style>
@@ -6274,165 +5431,214 @@
             </a:fontRef>
           </p:style>
           <p:txBody>
-            <a:bodyPr anchor="ctr"/>
+            <a:bodyPr anchor="t"/>
             <a:lstStyle/>
             <a:p>
-              <a:pPr algn="ctr" eaLnBrk="1" hangingPunct="1">
-                <a:defRPr/>
-              </a:pPr>
-              <a:endParaRPr lang="en-US" sz="1400" dirty="0">
+              <a:pPr algn="ctr"/>
+              <a:r>
+                <a:rPr lang="de-DE" sz="1300" b="1" dirty="0">
+                  <a:solidFill>
+                    <a:schemeClr val="tx1"/>
+                  </a:solidFill>
+                  <a:latin typeface="Myriad Pro SemiCond" panose="020B0503030403020204" pitchFamily="34" charset="0"/>
+                </a:rPr>
+                <a:t>Frontend</a:t>
+              </a:r>
+              <a:endParaRPr lang="en-US" sz="1300" b="1" dirty="0">
+                <a:solidFill>
+                  <a:schemeClr val="tx1"/>
+                </a:solidFill>
                 <a:latin typeface="Myriad Pro SemiCond" panose="020B0503030403020204" pitchFamily="34" charset="0"/>
               </a:endParaRPr>
             </a:p>
           </p:txBody>
         </p:sp>
-        <p:pic>
-          <p:nvPicPr>
-            <p:cNvPr id="104" name="Picture 103"/>
-            <p:cNvPicPr>
-              <a:picLocks noChangeAspect="1"/>
-            </p:cNvPicPr>
+        <p:grpSp>
+          <p:nvGrpSpPr>
+            <p:cNvPr id="89" name="Group 88"/>
+            <p:cNvGrpSpPr/>
             <p:nvPr/>
-          </p:nvPicPr>
-          <p:blipFill>
-            <a:blip r:embed="rId12" cstate="print">
-              <a:extLst>
-                <a:ext uri="{28A0092B-C50C-407E-A947-70E740481C1C}">
-                  <a14:useLocalDpi xmlns:a14="http://schemas.microsoft.com/office/drawing/2010/main" val="0"/>
-                </a:ext>
-              </a:extLst>
-            </a:blip>
-            <a:stretch>
-              <a:fillRect/>
-            </a:stretch>
-          </p:blipFill>
-          <p:spPr>
+          </p:nvGrpSpPr>
+          <p:grpSpPr>
             <a:xfrm>
-              <a:off x="1659980" y="640213"/>
-              <a:ext cx="475489" cy="475489"/>
+              <a:off x="10925874" y="792822"/>
+              <a:ext cx="1221148" cy="631019"/>
+              <a:chOff x="8877128" y="4325992"/>
+              <a:chExt cx="1221148" cy="631019"/>
             </a:xfrm>
-            <a:prstGeom prst="rect">
-              <a:avLst/>
-            </a:prstGeom>
-          </p:spPr>
-        </p:pic>
-      </p:grpSp>
-      <p:sp>
-        <p:nvSpPr>
-          <p:cNvPr id="105" name="Rechteck 94"/>
-          <p:cNvSpPr/>
-          <p:nvPr/>
-        </p:nvSpPr>
-        <p:spPr>
-          <a:xfrm>
-            <a:off x="9353845" y="793674"/>
-            <a:ext cx="1055978" cy="352500"/>
-          </a:xfrm>
-          <a:prstGeom prst="rect">
-            <a:avLst/>
-          </a:prstGeom>
-          <a:ln w="12700"/>
-        </p:spPr>
-        <p:style>
-          <a:lnRef idx="2">
-            <a:schemeClr val="dk1"/>
-          </a:lnRef>
-          <a:fillRef idx="1">
-            <a:schemeClr val="lt1"/>
-          </a:fillRef>
-          <a:effectRef idx="0">
-            <a:schemeClr val="dk1"/>
-          </a:effectRef>
-          <a:fontRef idx="minor">
-            <a:schemeClr val="dk1"/>
-          </a:fontRef>
-        </p:style>
-        <p:txBody>
-          <a:bodyPr anchor="ctr"/>
-          <a:lstStyle/>
-          <a:p>
-            <a:pPr algn="ctr">
-              <a:defRPr/>
-            </a:pPr>
-            <a:r>
-              <a:rPr lang="en-GB" sz="1200" dirty="0">
-                <a:latin typeface="Myriad Pro SemiCond" panose="020B0503030403020204" pitchFamily="34" charset="0"/>
-              </a:rPr>
-              <a:t>Visualization</a:t>
-            </a:r>
-            <a:endParaRPr lang="en-US" sz="1200" dirty="0">
-              <a:latin typeface="Myriad Pro SemiCond" panose="020B0503030403020204" pitchFamily="34" charset="0"/>
-            </a:endParaRPr>
-          </a:p>
-        </p:txBody>
-      </p:sp>
-      <p:grpSp>
-        <p:nvGrpSpPr>
-          <p:cNvPr id="106" name="Group 105"/>
-          <p:cNvGrpSpPr/>
-          <p:nvPr/>
-        </p:nvGrpSpPr>
-        <p:grpSpPr>
-          <a:xfrm>
-            <a:off x="9353845" y="1230416"/>
-            <a:ext cx="1214406" cy="354413"/>
-            <a:chOff x="9919789" y="1114813"/>
-            <a:chExt cx="1214406" cy="354413"/>
-          </a:xfrm>
-        </p:grpSpPr>
+          </p:grpSpPr>
+          <p:sp>
+            <p:nvSpPr>
+              <p:cNvPr id="90" name="Rechteck 148"/>
+              <p:cNvSpPr/>
+              <p:nvPr/>
+            </p:nvSpPr>
+            <p:spPr>
+              <a:xfrm>
+                <a:off x="8877128" y="4325992"/>
+                <a:ext cx="1221148" cy="631019"/>
+              </a:xfrm>
+              <a:prstGeom prst="rect">
+                <a:avLst/>
+              </a:prstGeom>
+              <a:ln w="12700"/>
+            </p:spPr>
+            <p:style>
+              <a:lnRef idx="2">
+                <a:schemeClr val="dk1"/>
+              </a:lnRef>
+              <a:fillRef idx="1">
+                <a:schemeClr val="lt1"/>
+              </a:fillRef>
+              <a:effectRef idx="0">
+                <a:schemeClr val="dk1"/>
+              </a:effectRef>
+              <a:fontRef idx="minor">
+                <a:schemeClr val="dk1"/>
+              </a:fontRef>
+            </p:style>
+            <p:txBody>
+              <a:bodyPr anchor="ctr"/>
+              <a:lstStyle/>
+              <a:p>
+                <a:pPr algn="ctr" eaLnBrk="1" hangingPunct="1">
+                  <a:defRPr/>
+                </a:pPr>
+                <a:endParaRPr lang="en-US" sz="1400" dirty="0">
+                  <a:latin typeface="Myriad Pro SemiCond" panose="020B0503030403020204" pitchFamily="34" charset="0"/>
+                </a:endParaRPr>
+              </a:p>
+            </p:txBody>
+          </p:sp>
+          <p:pic>
+            <p:nvPicPr>
+              <p:cNvPr id="92" name="Picture 91"/>
+              <p:cNvPicPr>
+                <a:picLocks noChangeAspect="1"/>
+              </p:cNvPicPr>
+              <p:nvPr/>
+            </p:nvPicPr>
+            <p:blipFill>
+              <a:blip r:embed="rId10" cstate="print">
+                <a:extLst>
+                  <a:ext uri="{28A0092B-C50C-407E-A947-70E740481C1C}">
+                    <a14:useLocalDpi xmlns:a14="http://schemas.microsoft.com/office/drawing/2010/main" val="0"/>
+                  </a:ext>
+                </a:extLst>
+              </a:blip>
+              <a:stretch>
+                <a:fillRect/>
+              </a:stretch>
+            </p:blipFill>
+            <p:spPr>
+              <a:xfrm>
+                <a:off x="9025843" y="4350138"/>
+                <a:ext cx="915264" cy="560680"/>
+              </a:xfrm>
+              <a:prstGeom prst="rect">
+                <a:avLst/>
+              </a:prstGeom>
+            </p:spPr>
+          </p:pic>
+        </p:grpSp>
+        <p:grpSp>
+          <p:nvGrpSpPr>
+            <p:cNvPr id="102" name="Group 101"/>
+            <p:cNvGrpSpPr/>
+            <p:nvPr/>
+          </p:nvGrpSpPr>
+          <p:grpSpPr>
+            <a:xfrm>
+              <a:off x="8378140" y="738090"/>
+              <a:ext cx="2262561" cy="763249"/>
+              <a:chOff x="1458906" y="522960"/>
+              <a:chExt cx="2297573" cy="763249"/>
+            </a:xfrm>
+          </p:grpSpPr>
+          <p:sp>
+            <p:nvSpPr>
+              <p:cNvPr id="103" name="Rechteck 147"/>
+              <p:cNvSpPr/>
+              <p:nvPr/>
+            </p:nvSpPr>
+            <p:spPr>
+              <a:xfrm>
+                <a:off x="1458906" y="522960"/>
+                <a:ext cx="2297573" cy="763249"/>
+              </a:xfrm>
+              <a:prstGeom prst="rect">
+                <a:avLst/>
+              </a:prstGeom>
+              <a:ln w="12700"/>
+            </p:spPr>
+            <p:style>
+              <a:lnRef idx="2">
+                <a:schemeClr val="dk1"/>
+              </a:lnRef>
+              <a:fillRef idx="1">
+                <a:schemeClr val="lt1"/>
+              </a:fillRef>
+              <a:effectRef idx="0">
+                <a:schemeClr val="dk1"/>
+              </a:effectRef>
+              <a:fontRef idx="minor">
+                <a:schemeClr val="dk1"/>
+              </a:fontRef>
+            </p:style>
+            <p:txBody>
+              <a:bodyPr anchor="ctr"/>
+              <a:lstStyle/>
+              <a:p>
+                <a:pPr algn="ctr" eaLnBrk="1" hangingPunct="1">
+                  <a:defRPr/>
+                </a:pPr>
+                <a:endParaRPr lang="en-US" sz="1400" dirty="0">
+                  <a:latin typeface="Myriad Pro SemiCond" panose="020B0503030403020204" pitchFamily="34" charset="0"/>
+                </a:endParaRPr>
+              </a:p>
+            </p:txBody>
+          </p:sp>
+          <p:pic>
+            <p:nvPicPr>
+              <p:cNvPr id="104" name="Picture 103"/>
+              <p:cNvPicPr>
+                <a:picLocks noChangeAspect="1"/>
+              </p:cNvPicPr>
+              <p:nvPr/>
+            </p:nvPicPr>
+            <p:blipFill>
+              <a:blip r:embed="rId11" cstate="print">
+                <a:extLst>
+                  <a:ext uri="{28A0092B-C50C-407E-A947-70E740481C1C}">
+                    <a14:useLocalDpi xmlns:a14="http://schemas.microsoft.com/office/drawing/2010/main" val="0"/>
+                  </a:ext>
+                </a:extLst>
+              </a:blip>
+              <a:stretch>
+                <a:fillRect/>
+              </a:stretch>
+            </p:blipFill>
+            <p:spPr>
+              <a:xfrm>
+                <a:off x="1659980" y="640213"/>
+                <a:ext cx="475489" cy="475489"/>
+              </a:xfrm>
+              <a:prstGeom prst="rect">
+                <a:avLst/>
+              </a:prstGeom>
+            </p:spPr>
+          </p:pic>
+        </p:grpSp>
         <p:sp>
           <p:nvSpPr>
-            <p:cNvPr id="109" name="Rechteck 94"/>
+            <p:cNvPr id="105" name="Rechteck 94"/>
             <p:cNvSpPr/>
             <p:nvPr/>
           </p:nvSpPr>
           <p:spPr>
             <a:xfrm>
-              <a:off x="9919789" y="1114813"/>
-              <a:ext cx="1172370" cy="301124"/>
-            </a:xfrm>
-            <a:prstGeom prst="rect">
-              <a:avLst/>
-            </a:prstGeom>
-            <a:ln w="12700"/>
-          </p:spPr>
-          <p:style>
-            <a:lnRef idx="2">
-              <a:schemeClr val="dk1"/>
-            </a:lnRef>
-            <a:fillRef idx="1">
-              <a:schemeClr val="lt1"/>
-            </a:fillRef>
-            <a:effectRef idx="0">
-              <a:schemeClr val="dk1"/>
-            </a:effectRef>
-            <a:fontRef idx="minor">
-              <a:schemeClr val="dk1"/>
-            </a:fontRef>
-          </p:style>
-          <p:txBody>
-            <a:bodyPr anchor="ctr"/>
-            <a:lstStyle/>
-            <a:p>
-              <a:pPr algn="ctr">
-                <a:defRPr/>
-              </a:pPr>
-              <a:endParaRPr lang="en-US" sz="1000" dirty="0">
-                <a:latin typeface="Myriad Pro SemiCond" panose="020B0503030403020204" pitchFamily="34" charset="0"/>
-              </a:endParaRPr>
-            </a:p>
-          </p:txBody>
-        </p:sp>
-        <p:sp>
-          <p:nvSpPr>
-            <p:cNvPr id="110" name="Rechteck 94"/>
-            <p:cNvSpPr/>
-            <p:nvPr/>
-          </p:nvSpPr>
-          <p:spPr>
-            <a:xfrm>
-              <a:off x="9961825" y="1168102"/>
-              <a:ext cx="1172370" cy="301124"/>
+              <a:off x="9353845" y="793674"/>
+              <a:ext cx="1055978" cy="352500"/>
             </a:xfrm>
             <a:prstGeom prst="rect">
               <a:avLst/>
@@ -6461,17 +5667,124 @@
                 <a:defRPr/>
               </a:pPr>
               <a:r>
-                <a:rPr lang="de-DE" sz="1000" dirty="0">
+                <a:rPr lang="en-GB" sz="1200" dirty="0">
                   <a:latin typeface="Myriad Pro SemiCond" panose="020B0503030403020204" pitchFamily="34" charset="0"/>
                 </a:rPr>
-                <a:t>Frontend-Extension</a:t>
+                <a:t>Visualization</a:t>
               </a:r>
-              <a:endParaRPr lang="en-US" sz="1000" dirty="0">
+              <a:endParaRPr lang="en-US" sz="1200" dirty="0">
                 <a:latin typeface="Myriad Pro SemiCond" panose="020B0503030403020204" pitchFamily="34" charset="0"/>
               </a:endParaRPr>
             </a:p>
           </p:txBody>
         </p:sp>
+        <p:grpSp>
+          <p:nvGrpSpPr>
+            <p:cNvPr id="106" name="Group 105"/>
+            <p:cNvGrpSpPr/>
+            <p:nvPr/>
+          </p:nvGrpSpPr>
+          <p:grpSpPr>
+            <a:xfrm>
+              <a:off x="9353845" y="1230416"/>
+              <a:ext cx="1214406" cy="354413"/>
+              <a:chOff x="9919789" y="1114813"/>
+              <a:chExt cx="1214406" cy="354413"/>
+            </a:xfrm>
+          </p:grpSpPr>
+          <p:sp>
+            <p:nvSpPr>
+              <p:cNvPr id="109" name="Rechteck 94"/>
+              <p:cNvSpPr/>
+              <p:nvPr/>
+            </p:nvSpPr>
+            <p:spPr>
+              <a:xfrm>
+                <a:off x="9919789" y="1114813"/>
+                <a:ext cx="1172370" cy="301124"/>
+              </a:xfrm>
+              <a:prstGeom prst="rect">
+                <a:avLst/>
+              </a:prstGeom>
+              <a:ln w="12700"/>
+            </p:spPr>
+            <p:style>
+              <a:lnRef idx="2">
+                <a:schemeClr val="dk1"/>
+              </a:lnRef>
+              <a:fillRef idx="1">
+                <a:schemeClr val="lt1"/>
+              </a:fillRef>
+              <a:effectRef idx="0">
+                <a:schemeClr val="dk1"/>
+              </a:effectRef>
+              <a:fontRef idx="minor">
+                <a:schemeClr val="dk1"/>
+              </a:fontRef>
+            </p:style>
+            <p:txBody>
+              <a:bodyPr anchor="ctr"/>
+              <a:lstStyle/>
+              <a:p>
+                <a:pPr algn="ctr">
+                  <a:defRPr/>
+                </a:pPr>
+                <a:endParaRPr lang="en-US" sz="1000" dirty="0">
+                  <a:latin typeface="Myriad Pro SemiCond" panose="020B0503030403020204" pitchFamily="34" charset="0"/>
+                </a:endParaRPr>
+              </a:p>
+            </p:txBody>
+          </p:sp>
+          <p:sp>
+            <p:nvSpPr>
+              <p:cNvPr id="110" name="Rechteck 94"/>
+              <p:cNvSpPr/>
+              <p:nvPr/>
+            </p:nvSpPr>
+            <p:spPr>
+              <a:xfrm>
+                <a:off x="9961825" y="1168102"/>
+                <a:ext cx="1172370" cy="301124"/>
+              </a:xfrm>
+              <a:prstGeom prst="rect">
+                <a:avLst/>
+              </a:prstGeom>
+              <a:ln w="12700"/>
+            </p:spPr>
+            <p:style>
+              <a:lnRef idx="2">
+                <a:schemeClr val="dk1"/>
+              </a:lnRef>
+              <a:fillRef idx="1">
+                <a:schemeClr val="lt1"/>
+              </a:fillRef>
+              <a:effectRef idx="0">
+                <a:schemeClr val="dk1"/>
+              </a:effectRef>
+              <a:fontRef idx="minor">
+                <a:schemeClr val="dk1"/>
+              </a:fontRef>
+            </p:style>
+            <p:txBody>
+              <a:bodyPr anchor="ctr"/>
+              <a:lstStyle/>
+              <a:p>
+                <a:pPr algn="ctr">
+                  <a:defRPr/>
+                </a:pPr>
+                <a:r>
+                  <a:rPr lang="de-DE" sz="1000" dirty="0">
+                    <a:latin typeface="Myriad Pro SemiCond" panose="020B0503030403020204" pitchFamily="34" charset="0"/>
+                  </a:rPr>
+                  <a:t>Frontend-Extension</a:t>
+                </a:r>
+                <a:endParaRPr lang="en-US" sz="1000" dirty="0">
+                  <a:latin typeface="Myriad Pro SemiCond" panose="020B0503030403020204" pitchFamily="34" charset="0"/>
+                </a:endParaRPr>
+              </a:p>
+            </p:txBody>
+          </p:sp>
+        </p:grpSp>
       </p:grpSp>
       <p:cxnSp>
         <p:nvCxnSpPr>
@@ -6770,7 +6083,7 @@
             <p:nvPr/>
           </p:nvPicPr>
           <p:blipFill>
-            <a:blip r:embed="rId11" cstate="print">
+            <a:blip r:embed="rId12" cstate="print">
               <a:extLst>
                 <a:ext uri="{28A0092B-C50C-407E-A947-70E740481C1C}">
                   <a14:useLocalDpi xmlns:a14="http://schemas.microsoft.com/office/drawing/2010/main" val="0"/>
@@ -7302,7 +6615,7 @@
             <p:nvPr/>
           </p:nvPicPr>
           <p:blipFill>
-            <a:blip r:embed="rId11" cstate="print">
+            <a:blip r:embed="rId12" cstate="print">
               <a:extLst>
                 <a:ext uri="{28A0092B-C50C-407E-A947-70E740481C1C}">
                   <a14:useLocalDpi xmlns:a14="http://schemas.microsoft.com/office/drawing/2010/main" val="0"/>
@@ -7573,89 +6886,857 @@
           </a:p>
         </p:txBody>
       </p:sp>
-      <p:sp>
-        <p:nvSpPr>
-          <p:cNvPr id="143" name="TextBox 214">
-            <a:extLst>
-              <a:ext uri="{FF2B5EF4-FFF2-40B4-BE49-F238E27FC236}">
-                <a16:creationId xmlns:a16="http://schemas.microsoft.com/office/drawing/2014/main" id="{702162F5-A772-B443-8163-641790C1C916}"/>
-              </a:ext>
-            </a:extLst>
-          </p:cNvPr>
-          <p:cNvSpPr txBox="1"/>
+      <p:grpSp>
+        <p:nvGrpSpPr>
+          <p:cNvPr id="9" name="Group 8"/>
+          <p:cNvGrpSpPr/>
           <p:nvPr/>
-        </p:nvSpPr>
-        <p:spPr>
+        </p:nvGrpSpPr>
+        <p:grpSpPr>
           <a:xfrm>
-            <a:off x="7034688" y="4790508"/>
-            <a:ext cx="1052621" cy="461665"/>
+            <a:off x="6647311" y="2850984"/>
+            <a:ext cx="4444217" cy="2441441"/>
+            <a:chOff x="5035485" y="2866482"/>
+            <a:chExt cx="4444217" cy="2441441"/>
           </a:xfrm>
-          <a:prstGeom prst="rect">
-            <a:avLst/>
-          </a:prstGeom>
-          <a:noFill/>
-        </p:spPr>
-        <p:txBody>
-          <a:bodyPr wrap="square" rtlCol="0">
-            <a:spAutoFit/>
-          </a:bodyPr>
-          <a:lstStyle/>
-          <a:p>
-            <a:pPr algn="ctr"/>
-            <a:r>
-              <a:rPr lang="en-US" sz="1200" dirty="0">
-                <a:latin typeface="Myriad Pro SemiCond" panose="020B0503030403020204" pitchFamily="34" charset="0"/>
-              </a:rPr>
-              <a:t>User Lifecycle events</a:t>
-            </a:r>
-          </a:p>
-        </p:txBody>
-      </p:sp>
-      <p:cxnSp>
-        <p:nvCxnSpPr>
-          <p:cNvPr id="144" name="Gerade Verbindung mit Pfeil 97">
-            <a:extLst>
-              <a:ext uri="{FF2B5EF4-FFF2-40B4-BE49-F238E27FC236}">
-                <a16:creationId xmlns:a16="http://schemas.microsoft.com/office/drawing/2014/main" id="{2D68F7C0-676C-E149-B045-05BAFE135B09}"/>
-              </a:ext>
-            </a:extLst>
-          </p:cNvPr>
-          <p:cNvCxnSpPr>
-            <a:cxnSpLocks/>
-          </p:cNvCxnSpPr>
-          <p:nvPr/>
-        </p:nvCxnSpPr>
-        <p:spPr>
-          <a:xfrm>
-            <a:off x="7118567" y="4743034"/>
-            <a:ext cx="0" cy="564889"/>
-          </a:xfrm>
-          <a:prstGeom prst="straightConnector1">
-            <a:avLst/>
-          </a:prstGeom>
-          <a:ln w="44450">
-            <a:solidFill>
-              <a:schemeClr val="dk1"/>
-            </a:solidFill>
-            <a:headEnd type="none"/>
-            <a:tailEnd type="triangle"/>
-          </a:ln>
-        </p:spPr>
-        <p:style>
-          <a:lnRef idx="3">
-            <a:schemeClr val="dk1"/>
-          </a:lnRef>
-          <a:fillRef idx="0">
-            <a:schemeClr val="dk1"/>
-          </a:fillRef>
-          <a:effectRef idx="2">
-            <a:schemeClr val="dk1"/>
-          </a:effectRef>
-          <a:fontRef idx="minor">
-            <a:schemeClr val="tx1"/>
-          </a:fontRef>
-        </p:style>
-      </p:cxnSp>
+        </p:grpSpPr>
+        <p:cxnSp>
+          <p:nvCxnSpPr>
+            <p:cNvPr id="216" name="Gerade Verbindung mit Pfeil 97"/>
+            <p:cNvCxnSpPr>
+              <a:cxnSpLocks/>
+            </p:cNvCxnSpPr>
+            <p:nvPr/>
+          </p:nvCxnSpPr>
+          <p:spPr>
+            <a:xfrm>
+              <a:off x="6111986" y="4733355"/>
+              <a:ext cx="0" cy="564889"/>
+            </a:xfrm>
+            <a:prstGeom prst="straightConnector1">
+              <a:avLst/>
+            </a:prstGeom>
+            <a:ln w="44450">
+              <a:solidFill>
+                <a:schemeClr val="dk1"/>
+              </a:solidFill>
+              <a:headEnd type="none"/>
+              <a:tailEnd type="triangle"/>
+            </a:ln>
+          </p:spPr>
+          <p:style>
+            <a:lnRef idx="3">
+              <a:schemeClr val="dk1"/>
+            </a:lnRef>
+            <a:fillRef idx="0">
+              <a:schemeClr val="dk1"/>
+            </a:fillRef>
+            <a:effectRef idx="2">
+              <a:schemeClr val="dk1"/>
+            </a:effectRef>
+            <a:fontRef idx="minor">
+              <a:schemeClr val="tx1"/>
+            </a:fontRef>
+          </p:style>
+        </p:cxnSp>
+        <p:grpSp>
+          <p:nvGrpSpPr>
+            <p:cNvPr id="8" name="Group 7"/>
+            <p:cNvGrpSpPr/>
+            <p:nvPr/>
+          </p:nvGrpSpPr>
+          <p:grpSpPr>
+            <a:xfrm>
+              <a:off x="5035485" y="2866482"/>
+              <a:ext cx="4444217" cy="2441441"/>
+              <a:chOff x="5035485" y="2866482"/>
+              <a:chExt cx="4444217" cy="2441441"/>
+            </a:xfrm>
+          </p:grpSpPr>
+          <p:sp>
+            <p:nvSpPr>
+              <p:cNvPr id="201" name="Rechteck 94"/>
+              <p:cNvSpPr/>
+              <p:nvPr/>
+            </p:nvSpPr>
+            <p:spPr>
+              <a:xfrm>
+                <a:off x="5283604" y="2866815"/>
+                <a:ext cx="1343743" cy="1855968"/>
+              </a:xfrm>
+              <a:prstGeom prst="rect">
+                <a:avLst/>
+              </a:prstGeom>
+              <a:solidFill>
+                <a:schemeClr val="bg1"/>
+              </a:solidFill>
+              <a:ln w="12700"/>
+            </p:spPr>
+            <p:style>
+              <a:lnRef idx="2">
+                <a:schemeClr val="dk1"/>
+              </a:lnRef>
+              <a:fillRef idx="1">
+                <a:schemeClr val="lt1"/>
+              </a:fillRef>
+              <a:effectRef idx="0">
+                <a:schemeClr val="dk1"/>
+              </a:effectRef>
+              <a:fontRef idx="minor">
+                <a:schemeClr val="dk1"/>
+              </a:fontRef>
+            </p:style>
+            <p:txBody>
+              <a:bodyPr anchor="t"/>
+              <a:lstStyle/>
+              <a:p>
+                <a:pPr algn="ctr"/>
+                <a:r>
+                  <a:rPr lang="en-GB" sz="1300" b="1" dirty="0">
+                    <a:solidFill>
+                      <a:schemeClr val="tx1"/>
+                    </a:solidFill>
+                    <a:latin typeface="Myriad Pro SemiCond" panose="020B0503030403020204" pitchFamily="34" charset="0"/>
+                  </a:rPr>
+                  <a:t>Landscape</a:t>
+                </a:r>
+                <a:endParaRPr lang="en-US" sz="1300" b="1" dirty="0">
+                  <a:solidFill>
+                    <a:schemeClr val="tx1"/>
+                  </a:solidFill>
+                  <a:latin typeface="Myriad Pro SemiCond" panose="020B0503030403020204" pitchFamily="34" charset="0"/>
+                </a:endParaRPr>
+              </a:p>
+            </p:txBody>
+          </p:sp>
+          <p:grpSp>
+            <p:nvGrpSpPr>
+              <p:cNvPr id="202" name="Group 201"/>
+              <p:cNvGrpSpPr/>
+              <p:nvPr/>
+            </p:nvGrpSpPr>
+            <p:grpSpPr>
+              <a:xfrm>
+                <a:off x="5374128" y="3643001"/>
+                <a:ext cx="1162693" cy="452716"/>
+                <a:chOff x="2629873" y="1232261"/>
+                <a:chExt cx="1162693" cy="452716"/>
+              </a:xfrm>
+            </p:grpSpPr>
+            <p:sp>
+              <p:nvSpPr>
+                <p:cNvPr id="211" name="Rechteck 94"/>
+                <p:cNvSpPr/>
+                <p:nvPr/>
+              </p:nvSpPr>
+              <p:spPr>
+                <a:xfrm>
+                  <a:off x="2629873" y="1232261"/>
+                  <a:ext cx="1162693" cy="452716"/>
+                </a:xfrm>
+                <a:prstGeom prst="rect">
+                  <a:avLst/>
+                </a:prstGeom>
+                <a:ln w="12700"/>
+              </p:spPr>
+              <p:style>
+                <a:lnRef idx="2">
+                  <a:schemeClr val="dk1"/>
+                </a:lnRef>
+                <a:fillRef idx="1">
+                  <a:schemeClr val="lt1"/>
+                </a:fillRef>
+                <a:effectRef idx="0">
+                  <a:schemeClr val="dk1"/>
+                </a:effectRef>
+                <a:fontRef idx="minor">
+                  <a:schemeClr val="dk1"/>
+                </a:fontRef>
+              </p:style>
+              <p:txBody>
+                <a:bodyPr anchor="ctr"/>
+                <a:lstStyle/>
+                <a:p>
+                  <a:pPr algn="ctr">
+                    <a:defRPr/>
+                  </a:pPr>
+                  <a:endParaRPr lang="en-US" sz="1400" dirty="0">
+                    <a:latin typeface="Myriad Pro SemiCond" panose="020B0503030403020204" pitchFamily="34" charset="0"/>
+                  </a:endParaRPr>
+                </a:p>
+              </p:txBody>
+            </p:sp>
+            <p:pic>
+              <p:nvPicPr>
+                <p:cNvPr id="213" name="Picture 212"/>
+                <p:cNvPicPr>
+                  <a:picLocks noChangeAspect="1"/>
+                </p:cNvPicPr>
+                <p:nvPr/>
+              </p:nvPicPr>
+              <p:blipFill>
+                <a:blip r:embed="rId9" cstate="print">
+                  <a:extLst>
+                    <a:ext uri="{28A0092B-C50C-407E-A947-70E740481C1C}">
+                      <a14:useLocalDpi xmlns:a14="http://schemas.microsoft.com/office/drawing/2010/main" val="0"/>
+                    </a:ext>
+                  </a:extLst>
+                </a:blip>
+                <a:stretch>
+                  <a:fillRect/>
+                </a:stretch>
+              </p:blipFill>
+              <p:spPr>
+                <a:xfrm>
+                  <a:off x="2629873" y="1269946"/>
+                  <a:ext cx="1138854" cy="388953"/>
+                </a:xfrm>
+                <a:prstGeom prst="rect">
+                  <a:avLst/>
+                </a:prstGeom>
+              </p:spPr>
+            </p:pic>
+          </p:grpSp>
+          <p:cxnSp>
+            <p:nvCxnSpPr>
+              <p:cNvPr id="214" name="Gerade Verbindung mit Pfeil 97"/>
+              <p:cNvCxnSpPr/>
+              <p:nvPr/>
+            </p:nvCxnSpPr>
+            <p:spPr>
+              <a:xfrm flipV="1">
+                <a:off x="5830013" y="4714897"/>
+                <a:ext cx="0" cy="583347"/>
+              </a:xfrm>
+              <a:prstGeom prst="straightConnector1">
+                <a:avLst/>
+              </a:prstGeom>
+              <a:ln w="44450">
+                <a:solidFill>
+                  <a:schemeClr val="dk1"/>
+                </a:solidFill>
+                <a:headEnd type="none"/>
+                <a:tailEnd type="triangle"/>
+              </a:ln>
+            </p:spPr>
+            <p:style>
+              <a:lnRef idx="3">
+                <a:schemeClr val="dk1"/>
+              </a:lnRef>
+              <a:fillRef idx="0">
+                <a:schemeClr val="dk1"/>
+              </a:fillRef>
+              <a:effectRef idx="2">
+                <a:schemeClr val="dk1"/>
+              </a:effectRef>
+              <a:fontRef idx="minor">
+                <a:schemeClr val="tx1"/>
+              </a:fontRef>
+            </p:style>
+          </p:cxnSp>
+          <p:sp>
+            <p:nvSpPr>
+              <p:cNvPr id="215" name="TextBox 214"/>
+              <p:cNvSpPr txBox="1"/>
+              <p:nvPr/>
+            </p:nvSpPr>
+            <p:spPr>
+              <a:xfrm>
+                <a:off x="5035485" y="4820245"/>
+                <a:ext cx="1052621" cy="276999"/>
+              </a:xfrm>
+              <a:prstGeom prst="rect">
+                <a:avLst/>
+              </a:prstGeom>
+              <a:noFill/>
+            </p:spPr>
+            <p:txBody>
+              <a:bodyPr wrap="square" rtlCol="0">
+                <a:spAutoFit/>
+              </a:bodyPr>
+              <a:lstStyle/>
+              <a:p>
+                <a:pPr algn="ctr"/>
+                <a:r>
+                  <a:rPr lang="de-DE" sz="1200" dirty="0">
+                    <a:latin typeface="Myriad Pro SemiCond" panose="020B0503030403020204" pitchFamily="34" charset="0"/>
+                  </a:rPr>
+                  <a:t>Traces</a:t>
+                </a:r>
+                <a:endParaRPr lang="en-US" sz="1200" dirty="0">
+                  <a:latin typeface="Myriad Pro SemiCond" panose="020B0503030403020204" pitchFamily="34" charset="0"/>
+                </a:endParaRPr>
+              </a:p>
+            </p:txBody>
+          </p:sp>
+          <p:sp>
+            <p:nvSpPr>
+              <p:cNvPr id="217" name="TextBox 216"/>
+              <p:cNvSpPr txBox="1"/>
+              <p:nvPr/>
+            </p:nvSpPr>
+            <p:spPr>
+              <a:xfrm>
+                <a:off x="6040045" y="4820245"/>
+                <a:ext cx="1052621" cy="276999"/>
+              </a:xfrm>
+              <a:prstGeom prst="rect">
+                <a:avLst/>
+              </a:prstGeom>
+              <a:noFill/>
+            </p:spPr>
+            <p:txBody>
+              <a:bodyPr wrap="square" rtlCol="0">
+                <a:spAutoFit/>
+              </a:bodyPr>
+              <a:lstStyle/>
+              <a:p>
+                <a:pPr algn="ctr"/>
+                <a:r>
+                  <a:rPr lang="de-DE" sz="1200" dirty="0">
+                    <a:latin typeface="Myriad Pro SemiCond" panose="020B0503030403020204" pitchFamily="34" charset="0"/>
+                  </a:rPr>
+                  <a:t>Landscapes</a:t>
+                </a:r>
+                <a:endParaRPr lang="en-US" sz="1200" dirty="0">
+                  <a:latin typeface="Myriad Pro SemiCond" panose="020B0503030403020204" pitchFamily="34" charset="0"/>
+                </a:endParaRPr>
+              </a:p>
+            </p:txBody>
+          </p:sp>
+          <p:sp>
+            <p:nvSpPr>
+              <p:cNvPr id="231" name="Rechteck 94"/>
+              <p:cNvSpPr/>
+              <p:nvPr/>
+            </p:nvSpPr>
+            <p:spPr>
+              <a:xfrm>
+                <a:off x="8135959" y="2869205"/>
+                <a:ext cx="1343743" cy="1864148"/>
+              </a:xfrm>
+              <a:prstGeom prst="rect">
+                <a:avLst/>
+              </a:prstGeom>
+              <a:solidFill>
+                <a:schemeClr val="bg1"/>
+              </a:solidFill>
+              <a:ln w="12700"/>
+            </p:spPr>
+            <p:style>
+              <a:lnRef idx="2">
+                <a:schemeClr val="dk1"/>
+              </a:lnRef>
+              <a:fillRef idx="1">
+                <a:schemeClr val="lt1"/>
+              </a:fillRef>
+              <a:effectRef idx="0">
+                <a:schemeClr val="dk1"/>
+              </a:effectRef>
+              <a:fontRef idx="minor">
+                <a:schemeClr val="dk1"/>
+              </a:fontRef>
+            </p:style>
+            <p:txBody>
+              <a:bodyPr anchor="t"/>
+              <a:lstStyle/>
+              <a:p>
+                <a:pPr algn="ctr"/>
+                <a:r>
+                  <a:rPr lang="en-GB" sz="1300" b="1" dirty="0">
+                    <a:solidFill>
+                      <a:schemeClr val="tx1"/>
+                    </a:solidFill>
+                    <a:latin typeface="Myriad Pro SemiCond" panose="020B0503030403020204" pitchFamily="34" charset="0"/>
+                  </a:rPr>
+                  <a:t>Discovery</a:t>
+                </a:r>
+                <a:endParaRPr lang="en-US" sz="1300" b="1" dirty="0">
+                  <a:solidFill>
+                    <a:schemeClr val="tx1"/>
+                  </a:solidFill>
+                  <a:latin typeface="Myriad Pro SemiCond" panose="020B0503030403020204" pitchFamily="34" charset="0"/>
+                </a:endParaRPr>
+              </a:p>
+            </p:txBody>
+          </p:sp>
+          <p:grpSp>
+            <p:nvGrpSpPr>
+              <p:cNvPr id="43" name="Group 42"/>
+              <p:cNvGrpSpPr/>
+              <p:nvPr/>
+            </p:nvGrpSpPr>
+            <p:grpSpPr>
+              <a:xfrm>
+                <a:off x="8225493" y="3647135"/>
+                <a:ext cx="1162693" cy="452716"/>
+                <a:chOff x="4874238" y="1193476"/>
+                <a:chExt cx="1162693" cy="452716"/>
+              </a:xfrm>
+            </p:grpSpPr>
+            <p:sp>
+              <p:nvSpPr>
+                <p:cNvPr id="232" name="Rechteck 94"/>
+                <p:cNvSpPr/>
+                <p:nvPr/>
+              </p:nvSpPr>
+              <p:spPr>
+                <a:xfrm>
+                  <a:off x="4874238" y="1193476"/>
+                  <a:ext cx="1162693" cy="452716"/>
+                </a:xfrm>
+                <a:prstGeom prst="rect">
+                  <a:avLst/>
+                </a:prstGeom>
+                <a:ln w="12700"/>
+              </p:spPr>
+              <p:style>
+                <a:lnRef idx="2">
+                  <a:schemeClr val="dk1"/>
+                </a:lnRef>
+                <a:fillRef idx="1">
+                  <a:schemeClr val="lt1"/>
+                </a:fillRef>
+                <a:effectRef idx="0">
+                  <a:schemeClr val="dk1"/>
+                </a:effectRef>
+                <a:fontRef idx="minor">
+                  <a:schemeClr val="dk1"/>
+                </a:fontRef>
+              </p:style>
+              <p:txBody>
+                <a:bodyPr anchor="ctr"/>
+                <a:lstStyle/>
+                <a:p>
+                  <a:pPr algn="ctr">
+                    <a:defRPr/>
+                  </a:pPr>
+                  <a:endParaRPr lang="en-US" sz="1400" dirty="0">
+                    <a:latin typeface="Myriad Pro SemiCond" panose="020B0503030403020204" pitchFamily="34" charset="0"/>
+                  </a:endParaRPr>
+                </a:p>
+              </p:txBody>
+            </p:sp>
+            <p:pic>
+              <p:nvPicPr>
+                <p:cNvPr id="233" name="Picture 232"/>
+                <p:cNvPicPr>
+                  <a:picLocks noChangeAspect="1"/>
+                </p:cNvPicPr>
+                <p:nvPr/>
+              </p:nvPicPr>
+              <p:blipFill>
+                <a:blip r:embed="rId9" cstate="print">
+                  <a:extLst>
+                    <a:ext uri="{28A0092B-C50C-407E-A947-70E740481C1C}">
+                      <a14:useLocalDpi xmlns:a14="http://schemas.microsoft.com/office/drawing/2010/main" val="0"/>
+                    </a:ext>
+                  </a:extLst>
+                </a:blip>
+                <a:stretch>
+                  <a:fillRect/>
+                </a:stretch>
+              </p:blipFill>
+              <p:spPr>
+                <a:xfrm>
+                  <a:off x="4886157" y="1225357"/>
+                  <a:ext cx="1138854" cy="388953"/>
+                </a:xfrm>
+                <a:prstGeom prst="rect">
+                  <a:avLst/>
+                </a:prstGeom>
+              </p:spPr>
+            </p:pic>
+          </p:grpSp>
+          <p:cxnSp>
+            <p:nvCxnSpPr>
+              <p:cNvPr id="234" name="Gerade Verbindung mit Pfeil 97"/>
+              <p:cNvCxnSpPr/>
+              <p:nvPr/>
+            </p:nvCxnSpPr>
+            <p:spPr>
+              <a:xfrm>
+                <a:off x="8817585" y="4733355"/>
+                <a:ext cx="0" cy="564889"/>
+              </a:xfrm>
+              <a:prstGeom prst="straightConnector1">
+                <a:avLst/>
+              </a:prstGeom>
+              <a:ln w="44450">
+                <a:solidFill>
+                  <a:schemeClr val="dk1"/>
+                </a:solidFill>
+                <a:headEnd type="triangle"/>
+                <a:tailEnd type="none"/>
+              </a:ln>
+            </p:spPr>
+            <p:style>
+              <a:lnRef idx="3">
+                <a:schemeClr val="dk1"/>
+              </a:lnRef>
+              <a:fillRef idx="0">
+                <a:schemeClr val="dk1"/>
+              </a:fillRef>
+              <a:effectRef idx="2">
+                <a:schemeClr val="dk1"/>
+              </a:effectRef>
+              <a:fontRef idx="minor">
+                <a:schemeClr val="tx1"/>
+              </a:fontRef>
+            </p:style>
+          </p:cxnSp>
+          <p:sp>
+            <p:nvSpPr>
+              <p:cNvPr id="236" name="Rechteck 94"/>
+              <p:cNvSpPr/>
+              <p:nvPr/>
+            </p:nvSpPr>
+            <p:spPr>
+              <a:xfrm>
+                <a:off x="6715232" y="2866482"/>
+                <a:ext cx="1343743" cy="1854821"/>
+              </a:xfrm>
+              <a:prstGeom prst="rect">
+                <a:avLst/>
+              </a:prstGeom>
+              <a:solidFill>
+                <a:schemeClr val="bg1"/>
+              </a:solidFill>
+              <a:ln w="12700"/>
+            </p:spPr>
+            <p:style>
+              <a:lnRef idx="2">
+                <a:schemeClr val="dk1"/>
+              </a:lnRef>
+              <a:fillRef idx="1">
+                <a:schemeClr val="lt1"/>
+              </a:fillRef>
+              <a:effectRef idx="0">
+                <a:schemeClr val="dk1"/>
+              </a:effectRef>
+              <a:fontRef idx="minor">
+                <a:schemeClr val="dk1"/>
+              </a:fontRef>
+            </p:style>
+            <p:txBody>
+              <a:bodyPr anchor="t"/>
+              <a:lstStyle/>
+              <a:p>
+                <a:pPr algn="ctr"/>
+                <a:r>
+                  <a:rPr lang="en-GB" sz="1300" b="1" dirty="0">
+                    <a:solidFill>
+                      <a:schemeClr val="tx1"/>
+                    </a:solidFill>
+                    <a:latin typeface="Myriad Pro SemiCond" panose="020B0503030403020204" pitchFamily="34" charset="0"/>
+                  </a:rPr>
+                  <a:t>User</a:t>
+                </a:r>
+                <a:endParaRPr lang="en-US" sz="1300" b="1" dirty="0">
+                  <a:solidFill>
+                    <a:schemeClr val="tx1"/>
+                  </a:solidFill>
+                  <a:latin typeface="Myriad Pro SemiCond" panose="020B0503030403020204" pitchFamily="34" charset="0"/>
+                </a:endParaRPr>
+              </a:p>
+            </p:txBody>
+          </p:sp>
+          <p:grpSp>
+            <p:nvGrpSpPr>
+              <p:cNvPr id="237" name="Group 236"/>
+              <p:cNvGrpSpPr/>
+              <p:nvPr/>
+            </p:nvGrpSpPr>
+            <p:grpSpPr>
+              <a:xfrm>
+                <a:off x="6805756" y="3644489"/>
+                <a:ext cx="1162693" cy="452716"/>
+                <a:chOff x="2629873" y="1232261"/>
+                <a:chExt cx="1162693" cy="452716"/>
+              </a:xfrm>
+            </p:grpSpPr>
+            <p:sp>
+              <p:nvSpPr>
+                <p:cNvPr id="238" name="Rechteck 94"/>
+                <p:cNvSpPr/>
+                <p:nvPr/>
+              </p:nvSpPr>
+              <p:spPr>
+                <a:xfrm>
+                  <a:off x="2629873" y="1232261"/>
+                  <a:ext cx="1162693" cy="452716"/>
+                </a:xfrm>
+                <a:prstGeom prst="rect">
+                  <a:avLst/>
+                </a:prstGeom>
+                <a:ln w="12700"/>
+              </p:spPr>
+              <p:style>
+                <a:lnRef idx="2">
+                  <a:schemeClr val="dk1"/>
+                </a:lnRef>
+                <a:fillRef idx="1">
+                  <a:schemeClr val="lt1"/>
+                </a:fillRef>
+                <a:effectRef idx="0">
+                  <a:schemeClr val="dk1"/>
+                </a:effectRef>
+                <a:fontRef idx="minor">
+                  <a:schemeClr val="dk1"/>
+                </a:fontRef>
+              </p:style>
+              <p:txBody>
+                <a:bodyPr anchor="ctr"/>
+                <a:lstStyle/>
+                <a:p>
+                  <a:pPr algn="ctr">
+                    <a:defRPr/>
+                  </a:pPr>
+                  <a:endParaRPr lang="en-US" sz="1400" dirty="0">
+                    <a:latin typeface="Myriad Pro SemiCond" panose="020B0503030403020204" pitchFamily="34" charset="0"/>
+                  </a:endParaRPr>
+                </a:p>
+              </p:txBody>
+            </p:sp>
+            <p:pic>
+              <p:nvPicPr>
+                <p:cNvPr id="239" name="Picture 238"/>
+                <p:cNvPicPr>
+                  <a:picLocks noChangeAspect="1"/>
+                </p:cNvPicPr>
+                <p:nvPr/>
+              </p:nvPicPr>
+              <p:blipFill>
+                <a:blip r:embed="rId9" cstate="print">
+                  <a:extLst>
+                    <a:ext uri="{28A0092B-C50C-407E-A947-70E740481C1C}">
+                      <a14:useLocalDpi xmlns:a14="http://schemas.microsoft.com/office/drawing/2010/main" val="0"/>
+                    </a:ext>
+                  </a:extLst>
+                </a:blip>
+                <a:stretch>
+                  <a:fillRect/>
+                </a:stretch>
+              </p:blipFill>
+              <p:spPr>
+                <a:xfrm>
+                  <a:off x="2629873" y="1269946"/>
+                  <a:ext cx="1138854" cy="388953"/>
+                </a:xfrm>
+                <a:prstGeom prst="rect">
+                  <a:avLst/>
+                </a:prstGeom>
+              </p:spPr>
+            </p:pic>
+          </p:grpSp>
+          <p:sp>
+            <p:nvSpPr>
+              <p:cNvPr id="248" name="TextBox 247"/>
+              <p:cNvSpPr txBox="1"/>
+              <p:nvPr/>
+            </p:nvSpPr>
+            <p:spPr>
+              <a:xfrm>
+                <a:off x="7959003" y="4819961"/>
+                <a:ext cx="872093" cy="276999"/>
+              </a:xfrm>
+              <a:prstGeom prst="rect">
+                <a:avLst/>
+              </a:prstGeom>
+              <a:noFill/>
+            </p:spPr>
+            <p:txBody>
+              <a:bodyPr wrap="square" rtlCol="0">
+                <a:spAutoFit/>
+              </a:bodyPr>
+              <a:lstStyle/>
+              <a:p>
+                <a:pPr algn="ctr"/>
+                <a:r>
+                  <a:rPr lang="de-DE" sz="1200" dirty="0" err="1">
+                    <a:latin typeface="Myriad Pro SemiCond" panose="020B0503030403020204" pitchFamily="34" charset="0"/>
+                  </a:rPr>
+                  <a:t>Processes</a:t>
+                </a:r>
+                <a:endParaRPr lang="en-US" sz="1200" dirty="0">
+                  <a:latin typeface="Myriad Pro SemiCond" panose="020B0503030403020204" pitchFamily="34" charset="0"/>
+                </a:endParaRPr>
+              </a:p>
+            </p:txBody>
+          </p:sp>
+          <p:grpSp>
+            <p:nvGrpSpPr>
+              <p:cNvPr id="5" name="Group 4"/>
+              <p:cNvGrpSpPr/>
+              <p:nvPr/>
+            </p:nvGrpSpPr>
+            <p:grpSpPr>
+              <a:xfrm>
+                <a:off x="6799361" y="4181004"/>
+                <a:ext cx="1162693" cy="452716"/>
+                <a:chOff x="6211561" y="4070976"/>
+                <a:chExt cx="1162693" cy="452716"/>
+              </a:xfrm>
+            </p:grpSpPr>
+            <p:sp>
+              <p:nvSpPr>
+                <p:cNvPr id="240" name="Rechteck 94"/>
+                <p:cNvSpPr/>
+                <p:nvPr/>
+              </p:nvSpPr>
+              <p:spPr>
+                <a:xfrm>
+                  <a:off x="6211561" y="4070976"/>
+                  <a:ext cx="1162693" cy="452716"/>
+                </a:xfrm>
+                <a:prstGeom prst="rect">
+                  <a:avLst/>
+                </a:prstGeom>
+                <a:ln w="12700"/>
+              </p:spPr>
+              <p:style>
+                <a:lnRef idx="2">
+                  <a:schemeClr val="dk1"/>
+                </a:lnRef>
+                <a:fillRef idx="1">
+                  <a:schemeClr val="lt1"/>
+                </a:fillRef>
+                <a:effectRef idx="0">
+                  <a:schemeClr val="dk1"/>
+                </a:effectRef>
+                <a:fontRef idx="minor">
+                  <a:schemeClr val="dk1"/>
+                </a:fontRef>
+              </p:style>
+              <p:txBody>
+                <a:bodyPr anchor="ctr"/>
+                <a:lstStyle/>
+                <a:p>
+                  <a:pPr algn="ctr">
+                    <a:defRPr/>
+                  </a:pPr>
+                  <a:endParaRPr lang="en-US" sz="1400" dirty="0">
+                    <a:latin typeface="Myriad Pro SemiCond" panose="020B0503030403020204" pitchFamily="34" charset="0"/>
+                  </a:endParaRPr>
+                </a:p>
+              </p:txBody>
+            </p:sp>
+            <p:pic>
+              <p:nvPicPr>
+                <p:cNvPr id="100" name="Picture 99"/>
+                <p:cNvPicPr>
+                  <a:picLocks noChangeAspect="1"/>
+                </p:cNvPicPr>
+                <p:nvPr/>
+              </p:nvPicPr>
+              <p:blipFill>
+                <a:blip r:embed="rId12" cstate="print">
+                  <a:extLst>
+                    <a:ext uri="{28A0092B-C50C-407E-A947-70E740481C1C}">
+                      <a14:useLocalDpi xmlns:a14="http://schemas.microsoft.com/office/drawing/2010/main" val="0"/>
+                    </a:ext>
+                  </a:extLst>
+                </a:blip>
+                <a:stretch>
+                  <a:fillRect/>
+                </a:stretch>
+              </p:blipFill>
+              <p:spPr>
+                <a:xfrm>
+                  <a:off x="6286684" y="4160526"/>
+                  <a:ext cx="1025235" cy="270640"/>
+                </a:xfrm>
+                <a:prstGeom prst="rect">
+                  <a:avLst/>
+                </a:prstGeom>
+              </p:spPr>
+            </p:pic>
+          </p:grpSp>
+          <p:sp>
+            <p:nvSpPr>
+              <p:cNvPr id="143" name="TextBox 214">
+                <a:extLst>
+                  <a:ext uri="{FF2B5EF4-FFF2-40B4-BE49-F238E27FC236}">
+                    <a16:creationId xmlns:a16="http://schemas.microsoft.com/office/drawing/2014/main" id="{702162F5-A772-B443-8163-641790C1C916}"/>
+                  </a:ext>
+                </a:extLst>
+              </p:cNvPr>
+              <p:cNvSpPr txBox="1"/>
+              <p:nvPr/>
+            </p:nvSpPr>
+            <p:spPr>
+              <a:xfrm>
+                <a:off x="7034688" y="4790508"/>
+                <a:ext cx="1052621" cy="461665"/>
+              </a:xfrm>
+              <a:prstGeom prst="rect">
+                <a:avLst/>
+              </a:prstGeom>
+              <a:noFill/>
+            </p:spPr>
+            <p:txBody>
+              <a:bodyPr wrap="square" rtlCol="0">
+                <a:spAutoFit/>
+              </a:bodyPr>
+              <a:lstStyle/>
+              <a:p>
+                <a:pPr algn="ctr"/>
+                <a:r>
+                  <a:rPr lang="en-US" sz="1200" dirty="0">
+                    <a:latin typeface="Myriad Pro SemiCond" panose="020B0503030403020204" pitchFamily="34" charset="0"/>
+                  </a:rPr>
+                  <a:t>User Lifecycle events</a:t>
+                </a:r>
+              </a:p>
+            </p:txBody>
+          </p:sp>
+          <p:cxnSp>
+            <p:nvCxnSpPr>
+              <p:cNvPr id="144" name="Gerade Verbindung mit Pfeil 97">
+                <a:extLst>
+                  <a:ext uri="{FF2B5EF4-FFF2-40B4-BE49-F238E27FC236}">
+                    <a16:creationId xmlns:a16="http://schemas.microsoft.com/office/drawing/2014/main" id="{2D68F7C0-676C-E149-B045-05BAFE135B09}"/>
+                  </a:ext>
+                </a:extLst>
+              </p:cNvPr>
+              <p:cNvCxnSpPr>
+                <a:cxnSpLocks/>
+              </p:cNvCxnSpPr>
+              <p:nvPr/>
+            </p:nvCxnSpPr>
+            <p:spPr>
+              <a:xfrm>
+                <a:off x="7118567" y="4743034"/>
+                <a:ext cx="0" cy="564889"/>
+              </a:xfrm>
+              <a:prstGeom prst="straightConnector1">
+                <a:avLst/>
+              </a:prstGeom>
+              <a:ln w="44450">
+                <a:solidFill>
+                  <a:schemeClr val="dk1"/>
+                </a:solidFill>
+                <a:headEnd type="none"/>
+                <a:tailEnd type="triangle"/>
+              </a:ln>
+            </p:spPr>
+            <p:style>
+              <a:lnRef idx="3">
+                <a:schemeClr val="dk1"/>
+              </a:lnRef>
+              <a:fillRef idx="0">
+                <a:schemeClr val="dk1"/>
+              </a:fillRef>
+              <a:effectRef idx="2">
+                <a:schemeClr val="dk1"/>
+              </a:effectRef>
+              <a:fontRef idx="minor">
+                <a:schemeClr val="tx1"/>
+              </a:fontRef>
+            </p:style>
+          </p:cxnSp>
+        </p:grpSp>
+      </p:grpSp>
     </p:spTree>
     <p:extLst>
       <p:ext uri="{BB962C8B-B14F-4D97-AF65-F5344CB8AC3E}">

</xml_diff>

<commit_message>
updated software stack image
</commit_message>
<xml_diff>
--- a/images/sources/software-stack.pptx
+++ b/images/sources/software-stack.pptx
@@ -197,7 +197,7 @@
           <a:p>
             <a:fld id="{EBC9B4AF-00B8-9B49-A331-47821E9A109F}" type="datetimeFigureOut">
               <a:rPr lang="de-DE" smtClean="0"/>
-              <a:t>16.07.2019</a:t>
+              <a:t>24.10.19</a:t>
             </a:fld>
             <a:endParaRPr lang="de-DE"/>
           </a:p>
@@ -355,7 +355,7 @@
           <a:p>
             <a:fld id="{8FF1BA80-479D-1A4A-B611-4F518723620D}" type="slidenum">
               <a:rPr lang="de-DE" smtClean="0"/>
-              <a:t>‹#›</a:t>
+              <a:t>‹Nr.›</a:t>
             </a:fld>
             <a:endParaRPr lang="de-DE"/>
           </a:p>
@@ -684,7 +684,7 @@
           <a:p>
             <a:fld id="{6FF236C8-150B-1847-A3A3-D70DFB942AB3}" type="datetimeFigureOut">
               <a:rPr lang="de-DE" smtClean="0"/>
-              <a:t>16.07.2019</a:t>
+              <a:t>24.10.19</a:t>
             </a:fld>
             <a:endParaRPr lang="de-DE"/>
           </a:p>
@@ -726,7 +726,7 @@
           <a:p>
             <a:fld id="{0AC82312-5793-8543-9CDB-82D1BFFF2087}" type="slidenum">
               <a:rPr lang="de-DE" smtClean="0"/>
-              <a:t>‹#›</a:t>
+              <a:t>‹Nr.›</a:t>
             </a:fld>
             <a:endParaRPr lang="de-DE"/>
           </a:p>
@@ -854,7 +854,7 @@
           <a:p>
             <a:fld id="{6FF236C8-150B-1847-A3A3-D70DFB942AB3}" type="datetimeFigureOut">
               <a:rPr lang="de-DE" smtClean="0"/>
-              <a:t>16.07.2019</a:t>
+              <a:t>24.10.19</a:t>
             </a:fld>
             <a:endParaRPr lang="de-DE"/>
           </a:p>
@@ -896,7 +896,7 @@
           <a:p>
             <a:fld id="{0AC82312-5793-8543-9CDB-82D1BFFF2087}" type="slidenum">
               <a:rPr lang="de-DE" smtClean="0"/>
-              <a:t>‹#›</a:t>
+              <a:t>‹Nr.›</a:t>
             </a:fld>
             <a:endParaRPr lang="de-DE"/>
           </a:p>
@@ -1034,7 +1034,7 @@
           <a:p>
             <a:fld id="{6FF236C8-150B-1847-A3A3-D70DFB942AB3}" type="datetimeFigureOut">
               <a:rPr lang="de-DE" smtClean="0"/>
-              <a:t>16.07.2019</a:t>
+              <a:t>24.10.19</a:t>
             </a:fld>
             <a:endParaRPr lang="de-DE"/>
           </a:p>
@@ -1076,7 +1076,7 @@
           <a:p>
             <a:fld id="{0AC82312-5793-8543-9CDB-82D1BFFF2087}" type="slidenum">
               <a:rPr lang="de-DE" smtClean="0"/>
-              <a:t>‹#›</a:t>
+              <a:t>‹Nr.›</a:t>
             </a:fld>
             <a:endParaRPr lang="de-DE"/>
           </a:p>
@@ -1204,7 +1204,7 @@
           <a:p>
             <a:fld id="{6FF236C8-150B-1847-A3A3-D70DFB942AB3}" type="datetimeFigureOut">
               <a:rPr lang="de-DE" smtClean="0"/>
-              <a:t>16.07.2019</a:t>
+              <a:t>24.10.19</a:t>
             </a:fld>
             <a:endParaRPr lang="de-DE"/>
           </a:p>
@@ -1246,7 +1246,7 @@
           <a:p>
             <a:fld id="{0AC82312-5793-8543-9CDB-82D1BFFF2087}" type="slidenum">
               <a:rPr lang="de-DE" smtClean="0"/>
-              <a:t>‹#›</a:t>
+              <a:t>‹Nr.›</a:t>
             </a:fld>
             <a:endParaRPr lang="de-DE"/>
           </a:p>
@@ -1450,7 +1450,7 @@
           <a:p>
             <a:fld id="{6FF236C8-150B-1847-A3A3-D70DFB942AB3}" type="datetimeFigureOut">
               <a:rPr lang="de-DE" smtClean="0"/>
-              <a:t>16.07.2019</a:t>
+              <a:t>24.10.19</a:t>
             </a:fld>
             <a:endParaRPr lang="de-DE"/>
           </a:p>
@@ -1492,7 +1492,7 @@
           <a:p>
             <a:fld id="{0AC82312-5793-8543-9CDB-82D1BFFF2087}" type="slidenum">
               <a:rPr lang="de-DE" smtClean="0"/>
-              <a:t>‹#›</a:t>
+              <a:t>‹Nr.›</a:t>
             </a:fld>
             <a:endParaRPr lang="de-DE"/>
           </a:p>
@@ -1682,7 +1682,7 @@
           <a:p>
             <a:fld id="{6FF236C8-150B-1847-A3A3-D70DFB942AB3}" type="datetimeFigureOut">
               <a:rPr lang="de-DE" smtClean="0"/>
-              <a:t>16.07.2019</a:t>
+              <a:t>24.10.19</a:t>
             </a:fld>
             <a:endParaRPr lang="de-DE"/>
           </a:p>
@@ -1724,7 +1724,7 @@
           <a:p>
             <a:fld id="{0AC82312-5793-8543-9CDB-82D1BFFF2087}" type="slidenum">
               <a:rPr lang="de-DE" smtClean="0"/>
-              <a:t>‹#›</a:t>
+              <a:t>‹Nr.›</a:t>
             </a:fld>
             <a:endParaRPr lang="de-DE"/>
           </a:p>
@@ -2049,7 +2049,7 @@
           <a:p>
             <a:fld id="{6FF236C8-150B-1847-A3A3-D70DFB942AB3}" type="datetimeFigureOut">
               <a:rPr lang="de-DE" smtClean="0"/>
-              <a:t>16.07.2019</a:t>
+              <a:t>24.10.19</a:t>
             </a:fld>
             <a:endParaRPr lang="de-DE"/>
           </a:p>
@@ -2091,7 +2091,7 @@
           <a:p>
             <a:fld id="{0AC82312-5793-8543-9CDB-82D1BFFF2087}" type="slidenum">
               <a:rPr lang="de-DE" smtClean="0"/>
-              <a:t>‹#›</a:t>
+              <a:t>‹Nr.›</a:t>
             </a:fld>
             <a:endParaRPr lang="de-DE"/>
           </a:p>
@@ -2167,7 +2167,7 @@
           <a:p>
             <a:fld id="{6FF236C8-150B-1847-A3A3-D70DFB942AB3}" type="datetimeFigureOut">
               <a:rPr lang="de-DE" smtClean="0"/>
-              <a:t>16.07.2019</a:t>
+              <a:t>24.10.19</a:t>
             </a:fld>
             <a:endParaRPr lang="de-DE"/>
           </a:p>
@@ -2209,7 +2209,7 @@
           <a:p>
             <a:fld id="{0AC82312-5793-8543-9CDB-82D1BFFF2087}" type="slidenum">
               <a:rPr lang="de-DE" smtClean="0"/>
-              <a:t>‹#›</a:t>
+              <a:t>‹Nr.›</a:t>
             </a:fld>
             <a:endParaRPr lang="de-DE"/>
           </a:p>
@@ -2262,7 +2262,7 @@
           <a:p>
             <a:fld id="{6FF236C8-150B-1847-A3A3-D70DFB942AB3}" type="datetimeFigureOut">
               <a:rPr lang="de-DE" smtClean="0"/>
-              <a:t>16.07.2019</a:t>
+              <a:t>24.10.19</a:t>
             </a:fld>
             <a:endParaRPr lang="de-DE"/>
           </a:p>
@@ -2304,7 +2304,7 @@
           <a:p>
             <a:fld id="{0AC82312-5793-8543-9CDB-82D1BFFF2087}" type="slidenum">
               <a:rPr lang="de-DE" smtClean="0"/>
-              <a:t>‹#›</a:t>
+              <a:t>‹Nr.›</a:t>
             </a:fld>
             <a:endParaRPr lang="de-DE"/>
           </a:p>
@@ -2539,7 +2539,7 @@
           <a:p>
             <a:fld id="{6FF236C8-150B-1847-A3A3-D70DFB942AB3}" type="datetimeFigureOut">
               <a:rPr lang="de-DE" smtClean="0"/>
-              <a:t>16.07.2019</a:t>
+              <a:t>24.10.19</a:t>
             </a:fld>
             <a:endParaRPr lang="de-DE"/>
           </a:p>
@@ -2581,7 +2581,7 @@
           <a:p>
             <a:fld id="{0AC82312-5793-8543-9CDB-82D1BFFF2087}" type="slidenum">
               <a:rPr lang="de-DE" smtClean="0"/>
-              <a:t>‹#›</a:t>
+              <a:t>‹Nr.›</a:t>
             </a:fld>
             <a:endParaRPr lang="de-DE"/>
           </a:p>
@@ -2796,7 +2796,7 @@
           <a:p>
             <a:fld id="{6FF236C8-150B-1847-A3A3-D70DFB942AB3}" type="datetimeFigureOut">
               <a:rPr lang="de-DE" smtClean="0"/>
-              <a:t>16.07.2019</a:t>
+              <a:t>24.10.19</a:t>
             </a:fld>
             <a:endParaRPr lang="de-DE"/>
           </a:p>
@@ -2838,7 +2838,7 @@
           <a:p>
             <a:fld id="{0AC82312-5793-8543-9CDB-82D1BFFF2087}" type="slidenum">
               <a:rPr lang="de-DE" smtClean="0"/>
-              <a:t>‹#›</a:t>
+              <a:t>‹Nr.›</a:t>
             </a:fld>
             <a:endParaRPr lang="de-DE"/>
           </a:p>
@@ -3009,7 +3009,7 @@
           <a:p>
             <a:fld id="{6FF236C8-150B-1847-A3A3-D70DFB942AB3}" type="datetimeFigureOut">
               <a:rPr lang="de-DE" smtClean="0"/>
-              <a:t>16.07.2019</a:t>
+              <a:t>24.10.19</a:t>
             </a:fld>
             <a:endParaRPr lang="de-DE"/>
           </a:p>
@@ -3087,7 +3087,7 @@
           <a:p>
             <a:fld id="{0AC82312-5793-8543-9CDB-82D1BFFF2087}" type="slidenum">
               <a:rPr lang="de-DE" smtClean="0"/>
-              <a:t>‹#›</a:t>
+              <a:t>‹Nr.›</a:t>
             </a:fld>
             <a:endParaRPr lang="de-DE"/>
           </a:p>
@@ -3496,30 +3496,6 @@
           </a:p>
         </p:txBody>
       </p:sp>
-      <p:pic>
-        <p:nvPicPr>
-          <p:cNvPr id="2" name="Picture 1"/>
-          <p:cNvPicPr>
-            <a:picLocks noChangeAspect="1"/>
-          </p:cNvPicPr>
-          <p:nvPr/>
-        </p:nvPicPr>
-        <p:blipFill>
-          <a:blip r:embed="rId3"/>
-          <a:stretch>
-            <a:fillRect/>
-          </a:stretch>
-        </p:blipFill>
-        <p:spPr>
-          <a:xfrm>
-            <a:off x="12884624" y="2101819"/>
-            <a:ext cx="1113585" cy="244788"/>
-          </a:xfrm>
-          <a:prstGeom prst="rect">
-            <a:avLst/>
-          </a:prstGeom>
-        </p:spPr>
-      </p:pic>
       <p:grpSp>
         <p:nvGrpSpPr>
           <p:cNvPr id="67" name="Group 66"/>
@@ -3640,7 +3616,7 @@
           <p:nvPr/>
         </p:nvPicPr>
         <p:blipFill rotWithShape="1">
-          <a:blip r:embed="rId4"/>
+          <a:blip r:embed="rId3"/>
           <a:srcRect t="-1718" b="1513"/>
           <a:stretch/>
         </p:blipFill>
@@ -3883,7 +3859,7 @@
             <p:nvPr/>
           </p:nvPicPr>
           <p:blipFill>
-            <a:blip r:embed="rId5" cstate="print">
+            <a:blip r:embed="rId4" cstate="print">
               <a:extLst>
                 <a:ext uri="{28A0092B-C50C-407E-A947-70E740481C1C}">
                   <a14:useLocalDpi xmlns:a14="http://schemas.microsoft.com/office/drawing/2010/main" val="0"/>
@@ -4021,7 +3997,7 @@
             <p:nvPr/>
           </p:nvPicPr>
           <p:blipFill>
-            <a:blip r:embed="rId6" cstate="print">
+            <a:blip r:embed="rId5" cstate="print">
               <a:extLst>
                 <a:ext uri="{28A0092B-C50C-407E-A947-70E740481C1C}">
                   <a14:useLocalDpi xmlns:a14="http://schemas.microsoft.com/office/drawing/2010/main" val="0"/>
@@ -4243,7 +4219,7 @@
                 <p:nvPr/>
               </p:nvPicPr>
               <p:blipFill>
-                <a:blip r:embed="rId7" cstate="print">
+                <a:blip r:embed="rId6" cstate="print">
                   <a:extLst>
                     <a:ext uri="{28A0092B-C50C-407E-A947-70E740481C1C}">
                       <a14:useLocalDpi xmlns:a14="http://schemas.microsoft.com/office/drawing/2010/main" val="0"/>
@@ -4460,9 +4436,9 @@
           </p:nvGrpSpPr>
           <p:grpSpPr>
             <a:xfrm>
-              <a:off x="3945192" y="3649366"/>
+              <a:off x="3936048" y="3649366"/>
               <a:ext cx="1162693" cy="452716"/>
-              <a:chOff x="4083144" y="2781360"/>
+              <a:chOff x="4074000" y="2781360"/>
               <a:chExt cx="1162693" cy="452716"/>
             </a:xfrm>
           </p:grpSpPr>
@@ -4474,7 +4450,7 @@
             </p:nvSpPr>
             <p:spPr>
               <a:xfrm>
-                <a:off x="4083144" y="2781360"/>
+                <a:off x="4074000" y="2781360"/>
                 <a:ext cx="1162693" cy="452716"/>
               </a:xfrm>
               <a:prstGeom prst="rect">
@@ -4518,7 +4494,7 @@
               <p:nvPr/>
             </p:nvPicPr>
             <p:blipFill>
-              <a:blip r:embed="rId8" cstate="print">
+              <a:blip r:embed="rId7" cstate="print">
                 <a:extLst>
                   <a:ext uri="{28A0092B-C50C-407E-A947-70E740481C1C}">
                     <a14:useLocalDpi xmlns:a14="http://schemas.microsoft.com/office/drawing/2010/main" val="0"/>
@@ -4531,7 +4507,7 @@
             </p:blipFill>
             <p:spPr>
               <a:xfrm>
-                <a:off x="4117702" y="2866577"/>
+                <a:off x="4108558" y="2866577"/>
                 <a:ext cx="1084040" cy="266194"/>
               </a:xfrm>
               <a:prstGeom prst="rect">
@@ -5059,7 +5035,7 @@
               <p:nvPr/>
             </p:nvPicPr>
             <p:blipFill>
-              <a:blip r:embed="rId9" cstate="print">
+              <a:blip r:embed="rId8" cstate="print">
                 <a:extLst>
                   <a:ext uri="{28A0092B-C50C-407E-A947-70E740481C1C}">
                     <a14:useLocalDpi xmlns:a14="http://schemas.microsoft.com/office/drawing/2010/main" val="0"/>
@@ -5519,7 +5495,7 @@
               <p:nvPr/>
             </p:nvPicPr>
             <p:blipFill>
-              <a:blip r:embed="rId10" cstate="print">
+              <a:blip r:embed="rId9" cstate="print">
                 <a:extLst>
                   <a:ext uri="{28A0092B-C50C-407E-A947-70E740481C1C}">
                     <a14:useLocalDpi xmlns:a14="http://schemas.microsoft.com/office/drawing/2010/main" val="0"/>
@@ -5607,7 +5583,7 @@
               <p:nvPr/>
             </p:nvPicPr>
             <p:blipFill>
-              <a:blip r:embed="rId11" cstate="print">
+              <a:blip r:embed="rId10" cstate="print">
                 <a:extLst>
                   <a:ext uri="{28A0092B-C50C-407E-A947-70E740481C1C}">
                     <a14:useLocalDpi xmlns:a14="http://schemas.microsoft.com/office/drawing/2010/main" val="0"/>
@@ -5977,7 +5953,7 @@
             <p:nvPr/>
           </p:nvPicPr>
           <p:blipFill>
-            <a:blip r:embed="rId9" cstate="print">
+            <a:blip r:embed="rId8" cstate="print">
               <a:extLst>
                 <a:ext uri="{28A0092B-C50C-407E-A947-70E740481C1C}">
                   <a14:useLocalDpi xmlns:a14="http://schemas.microsoft.com/office/drawing/2010/main" val="0"/>
@@ -6083,7 +6059,7 @@
             <p:nvPr/>
           </p:nvPicPr>
           <p:blipFill>
-            <a:blip r:embed="rId12" cstate="print">
+            <a:blip r:embed="rId11" cstate="print">
               <a:extLst>
                 <a:ext uri="{28A0092B-C50C-407E-A947-70E740481C1C}">
                   <a14:useLocalDpi xmlns:a14="http://schemas.microsoft.com/office/drawing/2010/main" val="0"/>
@@ -6296,7 +6272,7 @@
             <p:nvPr/>
           </p:nvPicPr>
           <p:blipFill>
-            <a:blip r:embed="rId9" cstate="print">
+            <a:blip r:embed="rId8" cstate="print">
               <a:extLst>
                 <a:ext uri="{28A0092B-C50C-407E-A947-70E740481C1C}">
                   <a14:useLocalDpi xmlns:a14="http://schemas.microsoft.com/office/drawing/2010/main" val="0"/>
@@ -6509,7 +6485,7 @@
             <p:nvPr/>
           </p:nvPicPr>
           <p:blipFill>
-            <a:blip r:embed="rId9" cstate="print">
+            <a:blip r:embed="rId8" cstate="print">
               <a:extLst>
                 <a:ext uri="{28A0092B-C50C-407E-A947-70E740481C1C}">
                   <a14:useLocalDpi xmlns:a14="http://schemas.microsoft.com/office/drawing/2010/main" val="0"/>
@@ -6615,7 +6591,7 @@
             <p:nvPr/>
           </p:nvPicPr>
           <p:blipFill>
-            <a:blip r:embed="rId12" cstate="print">
+            <a:blip r:embed="rId11" cstate="print">
               <a:extLst>
                 <a:ext uri="{28A0092B-C50C-407E-A947-70E740481C1C}">
                   <a14:useLocalDpi xmlns:a14="http://schemas.microsoft.com/office/drawing/2010/main" val="0"/>
@@ -7009,94 +6985,6 @@
               </a:p>
             </p:txBody>
           </p:sp>
-          <p:grpSp>
-            <p:nvGrpSpPr>
-              <p:cNvPr id="202" name="Group 201"/>
-              <p:cNvGrpSpPr/>
-              <p:nvPr/>
-            </p:nvGrpSpPr>
-            <p:grpSpPr>
-              <a:xfrm>
-                <a:off x="5374128" y="3643001"/>
-                <a:ext cx="1162693" cy="452716"/>
-                <a:chOff x="2629873" y="1232261"/>
-                <a:chExt cx="1162693" cy="452716"/>
-              </a:xfrm>
-            </p:grpSpPr>
-            <p:sp>
-              <p:nvSpPr>
-                <p:cNvPr id="211" name="Rechteck 94"/>
-                <p:cNvSpPr/>
-                <p:nvPr/>
-              </p:nvSpPr>
-              <p:spPr>
-                <a:xfrm>
-                  <a:off x="2629873" y="1232261"/>
-                  <a:ext cx="1162693" cy="452716"/>
-                </a:xfrm>
-                <a:prstGeom prst="rect">
-                  <a:avLst/>
-                </a:prstGeom>
-                <a:ln w="12700"/>
-              </p:spPr>
-              <p:style>
-                <a:lnRef idx="2">
-                  <a:schemeClr val="dk1"/>
-                </a:lnRef>
-                <a:fillRef idx="1">
-                  <a:schemeClr val="lt1"/>
-                </a:fillRef>
-                <a:effectRef idx="0">
-                  <a:schemeClr val="dk1"/>
-                </a:effectRef>
-                <a:fontRef idx="minor">
-                  <a:schemeClr val="dk1"/>
-                </a:fontRef>
-              </p:style>
-              <p:txBody>
-                <a:bodyPr anchor="ctr"/>
-                <a:lstStyle/>
-                <a:p>
-                  <a:pPr algn="ctr">
-                    <a:defRPr/>
-                  </a:pPr>
-                  <a:endParaRPr lang="en-US" sz="1400" dirty="0">
-                    <a:latin typeface="Myriad Pro SemiCond" panose="020B0503030403020204" pitchFamily="34" charset="0"/>
-                  </a:endParaRPr>
-                </a:p>
-              </p:txBody>
-            </p:sp>
-            <p:pic>
-              <p:nvPicPr>
-                <p:cNvPr id="213" name="Picture 212"/>
-                <p:cNvPicPr>
-                  <a:picLocks noChangeAspect="1"/>
-                </p:cNvPicPr>
-                <p:nvPr/>
-              </p:nvPicPr>
-              <p:blipFill>
-                <a:blip r:embed="rId9" cstate="print">
-                  <a:extLst>
-                    <a:ext uri="{28A0092B-C50C-407E-A947-70E740481C1C}">
-                      <a14:useLocalDpi xmlns:a14="http://schemas.microsoft.com/office/drawing/2010/main" val="0"/>
-                    </a:ext>
-                  </a:extLst>
-                </a:blip>
-                <a:stretch>
-                  <a:fillRect/>
-                </a:stretch>
-              </p:blipFill>
-              <p:spPr>
-                <a:xfrm>
-                  <a:off x="2629873" y="1269946"/>
-                  <a:ext cx="1138854" cy="388953"/>
-                </a:xfrm>
-                <a:prstGeom prst="rect">
-                  <a:avLst/>
-                </a:prstGeom>
-              </p:spPr>
-            </p:pic>
-          </p:grpSp>
           <p:cxnSp>
             <p:nvCxnSpPr>
               <p:cNvPr id="214" name="Gerade Verbindung mit Pfeil 97"/>
@@ -7326,7 +7214,7 @@
                 <p:nvPr/>
               </p:nvPicPr>
               <p:blipFill>
-                <a:blip r:embed="rId9" cstate="print">
+                <a:blip r:embed="rId8" cstate="print">
                   <a:extLst>
                     <a:ext uri="{28A0092B-C50C-407E-A947-70E740481C1C}">
                       <a14:useLocalDpi xmlns:a14="http://schemas.microsoft.com/office/drawing/2010/main" val="0"/>
@@ -7507,7 +7395,7 @@
                 <p:nvPr/>
               </p:nvPicPr>
               <p:blipFill>
-                <a:blip r:embed="rId9" cstate="print">
+                <a:blip r:embed="rId8" cstate="print">
                   <a:extLst>
                     <a:ext uri="{28A0092B-C50C-407E-A947-70E740481C1C}">
                       <a14:useLocalDpi xmlns:a14="http://schemas.microsoft.com/office/drawing/2010/main" val="0"/>
@@ -7630,7 +7518,7 @@
                 <p:nvPr/>
               </p:nvPicPr>
               <p:blipFill>
-                <a:blip r:embed="rId12" cstate="print">
+                <a:blip r:embed="rId11" cstate="print">
                   <a:extLst>
                     <a:ext uri="{28A0092B-C50C-407E-A947-70E740481C1C}">
                       <a14:useLocalDpi xmlns:a14="http://schemas.microsoft.com/office/drawing/2010/main" val="0"/>
@@ -7737,6 +7625,36 @@
           </p:cxnSp>
         </p:grpSp>
       </p:grpSp>
+      <p:pic>
+        <p:nvPicPr>
+          <p:cNvPr id="14" name="Grafik 13">
+            <a:extLst>
+              <a:ext uri="{FF2B5EF4-FFF2-40B4-BE49-F238E27FC236}">
+                <a16:creationId xmlns:a16="http://schemas.microsoft.com/office/drawing/2014/main" id="{CD4A08D8-7AD6-1D43-B870-CA6847C4636E}"/>
+              </a:ext>
+            </a:extLst>
+          </p:cNvPr>
+          <p:cNvPicPr>
+            <a:picLocks noChangeAspect="1"/>
+          </p:cNvPicPr>
+          <p:nvPr/>
+        </p:nvPicPr>
+        <p:blipFill>
+          <a:blip r:embed="rId12"/>
+          <a:stretch>
+            <a:fillRect/>
+          </a:stretch>
+        </p:blipFill>
+        <p:spPr>
+          <a:xfrm>
+            <a:off x="12905356" y="2069018"/>
+            <a:ext cx="1016000" cy="292100"/>
+          </a:xfrm>
+          <a:prstGeom prst="rect">
+            <a:avLst/>
+          </a:prstGeom>
+        </p:spPr>
+      </p:pic>
     </p:spTree>
     <p:extLst>
       <p:ext uri="{BB962C8B-B14F-4D97-AF65-F5344CB8AC3E}">

</xml_diff>